<commit_message>
Sun Sep 16 14:07:41 DST 2018 End of classes push
</commit_message>
<xml_diff>
--- a/api-engineering-cloud-computing/part01/01-Cloud Computing and OpenStack.pptx
+++ b/api-engineering-cloud-computing/part01/01-Cloud Computing and OpenStack.pptx
@@ -229,7 +229,7 @@
           <a:p>
             <a:fld id="{F01BC02F-66F6-4755-954F-5E7DCCA246FB}" type="datetimeFigureOut">
               <a:rPr lang="en-US" smtClean="0"/>
-              <a:t>9/9/2018</a:t>
+              <a:t>9/16/2018</a:t>
             </a:fld>
             <a:endParaRPr lang="en-US"/>
           </a:p>
@@ -293,38 +293,37 @@
           <a:p>
             <a:pPr lvl="0"/>
             <a:r>
-              <a:rPr lang="en-US" smtClean="0"/>
+              <a:rPr lang="en-US"/>
               <a:t>Click to edit Master text styles</a:t>
             </a:r>
           </a:p>
           <a:p>
             <a:pPr lvl="1"/>
             <a:r>
-              <a:rPr lang="en-US" smtClean="0"/>
+              <a:rPr lang="en-US"/>
               <a:t>Second level</a:t>
             </a:r>
           </a:p>
           <a:p>
             <a:pPr lvl="2"/>
             <a:r>
-              <a:rPr lang="en-US" smtClean="0"/>
+              <a:rPr lang="en-US"/>
               <a:t>Third level</a:t>
             </a:r>
           </a:p>
           <a:p>
             <a:pPr lvl="3"/>
             <a:r>
-              <a:rPr lang="en-US" smtClean="0"/>
+              <a:rPr lang="en-US"/>
               <a:t>Fourth level</a:t>
             </a:r>
           </a:p>
           <a:p>
             <a:pPr lvl="4"/>
             <a:r>
-              <a:rPr lang="en-US" smtClean="0"/>
+              <a:rPr lang="en-US"/>
               <a:t>Fifth level</a:t>
             </a:r>
-            <a:endParaRPr lang="en-US"/>
           </a:p>
         </p:txBody>
       </p:sp>
@@ -619,10 +618,9 @@
           <a:lstStyle/>
           <a:p>
             <a:r>
-              <a:rPr lang="en-US" smtClean="0"/>
+              <a:rPr lang="en-US"/>
               <a:t>Click to edit Master title style</a:t>
             </a:r>
-            <a:endParaRPr lang="en-US"/>
           </a:p>
         </p:txBody>
       </p:sp>
@@ -738,10 +736,9 @@
           </a:lstStyle>
           <a:p>
             <a:r>
-              <a:rPr lang="en-US" smtClean="0"/>
+              <a:rPr lang="en-US"/>
               <a:t>Click to edit Master subtitle style</a:t>
             </a:r>
-            <a:endParaRPr lang="en-US"/>
           </a:p>
         </p:txBody>
       </p:sp>
@@ -763,7 +760,7 @@
             <a:fld id="{1D8BD707-D9CF-40AE-B4C6-C98DA3205C09}" type="datetimeFigureOut">
               <a:rPr lang="en-US" smtClean="0"/>
               <a:pPr/>
-              <a:t>9/9/2018</a:t>
+              <a:t>9/16/2018</a:t>
             </a:fld>
             <a:endParaRPr lang="en-US"/>
           </a:p>
@@ -853,10 +850,9 @@
           <a:lstStyle/>
           <a:p>
             <a:r>
-              <a:rPr lang="en-US" smtClean="0"/>
+              <a:rPr lang="en-US"/>
               <a:t>Click to edit Master title style</a:t>
             </a:r>
-            <a:endParaRPr lang="en-US"/>
           </a:p>
         </p:txBody>
       </p:sp>
@@ -877,38 +873,37 @@
           <a:p>
             <a:pPr lvl="0"/>
             <a:r>
-              <a:rPr lang="en-US" smtClean="0"/>
+              <a:rPr lang="en-US"/>
               <a:t>Click to edit Master text styles</a:t>
             </a:r>
           </a:p>
           <a:p>
             <a:pPr lvl="1"/>
             <a:r>
-              <a:rPr lang="en-US" smtClean="0"/>
+              <a:rPr lang="en-US"/>
               <a:t>Second level</a:t>
             </a:r>
           </a:p>
           <a:p>
             <a:pPr lvl="2"/>
             <a:r>
-              <a:rPr lang="en-US" smtClean="0"/>
+              <a:rPr lang="en-US"/>
               <a:t>Third level</a:t>
             </a:r>
           </a:p>
           <a:p>
             <a:pPr lvl="3"/>
             <a:r>
-              <a:rPr lang="en-US" smtClean="0"/>
+              <a:rPr lang="en-US"/>
               <a:t>Fourth level</a:t>
             </a:r>
           </a:p>
           <a:p>
             <a:pPr lvl="4"/>
             <a:r>
-              <a:rPr lang="en-US" smtClean="0"/>
+              <a:rPr lang="en-US"/>
               <a:t>Fifth level</a:t>
             </a:r>
-            <a:endParaRPr lang="en-US"/>
           </a:p>
         </p:txBody>
       </p:sp>
@@ -930,7 +925,7 @@
             <a:fld id="{1D8BD707-D9CF-40AE-B4C6-C98DA3205C09}" type="datetimeFigureOut">
               <a:rPr lang="en-US" smtClean="0"/>
               <a:pPr/>
-              <a:t>9/9/2018</a:t>
+              <a:t>9/16/2018</a:t>
             </a:fld>
             <a:endParaRPr lang="en-US"/>
           </a:p>
@@ -1025,10 +1020,9 @@
           <a:lstStyle/>
           <a:p>
             <a:r>
-              <a:rPr lang="en-US" smtClean="0"/>
+              <a:rPr lang="en-US"/>
               <a:t>Click to edit Master title style</a:t>
             </a:r>
-            <a:endParaRPr lang="en-US"/>
           </a:p>
         </p:txBody>
       </p:sp>
@@ -1054,38 +1048,37 @@
           <a:p>
             <a:pPr lvl="0"/>
             <a:r>
-              <a:rPr lang="en-US" smtClean="0"/>
+              <a:rPr lang="en-US"/>
               <a:t>Click to edit Master text styles</a:t>
             </a:r>
           </a:p>
           <a:p>
             <a:pPr lvl="1"/>
             <a:r>
-              <a:rPr lang="en-US" smtClean="0"/>
+              <a:rPr lang="en-US"/>
               <a:t>Second level</a:t>
             </a:r>
           </a:p>
           <a:p>
             <a:pPr lvl="2"/>
             <a:r>
-              <a:rPr lang="en-US" smtClean="0"/>
+              <a:rPr lang="en-US"/>
               <a:t>Third level</a:t>
             </a:r>
           </a:p>
           <a:p>
             <a:pPr lvl="3"/>
             <a:r>
-              <a:rPr lang="en-US" smtClean="0"/>
+              <a:rPr lang="en-US"/>
               <a:t>Fourth level</a:t>
             </a:r>
           </a:p>
           <a:p>
             <a:pPr lvl="4"/>
             <a:r>
-              <a:rPr lang="en-US" smtClean="0"/>
+              <a:rPr lang="en-US"/>
               <a:t>Fifth level</a:t>
             </a:r>
-            <a:endParaRPr lang="en-US"/>
           </a:p>
         </p:txBody>
       </p:sp>
@@ -1107,7 +1100,7 @@
             <a:fld id="{1D8BD707-D9CF-40AE-B4C6-C98DA3205C09}" type="datetimeFigureOut">
               <a:rPr lang="en-US" smtClean="0"/>
               <a:pPr/>
-              <a:t>9/9/2018</a:t>
+              <a:t>9/16/2018</a:t>
             </a:fld>
             <a:endParaRPr lang="en-US"/>
           </a:p>
@@ -1197,10 +1190,9 @@
           <a:lstStyle/>
           <a:p>
             <a:r>
-              <a:rPr lang="en-US" smtClean="0"/>
+              <a:rPr lang="en-US"/>
               <a:t>Click to edit Master title style</a:t>
             </a:r>
-            <a:endParaRPr lang="en-US"/>
           </a:p>
         </p:txBody>
       </p:sp>
@@ -1221,38 +1213,37 @@
           <a:p>
             <a:pPr lvl="0"/>
             <a:r>
-              <a:rPr lang="en-US" smtClean="0"/>
+              <a:rPr lang="en-US"/>
               <a:t>Click to edit Master text styles</a:t>
             </a:r>
           </a:p>
           <a:p>
             <a:pPr lvl="1"/>
             <a:r>
-              <a:rPr lang="en-US" smtClean="0"/>
+              <a:rPr lang="en-US"/>
               <a:t>Second level</a:t>
             </a:r>
           </a:p>
           <a:p>
             <a:pPr lvl="2"/>
             <a:r>
-              <a:rPr lang="en-US" smtClean="0"/>
+              <a:rPr lang="en-US"/>
               <a:t>Third level</a:t>
             </a:r>
           </a:p>
           <a:p>
             <a:pPr lvl="3"/>
             <a:r>
-              <a:rPr lang="en-US" smtClean="0"/>
+              <a:rPr lang="en-US"/>
               <a:t>Fourth level</a:t>
             </a:r>
           </a:p>
           <a:p>
             <a:pPr lvl="4"/>
             <a:r>
-              <a:rPr lang="en-US" smtClean="0"/>
+              <a:rPr lang="en-US"/>
               <a:t>Fifth level</a:t>
             </a:r>
-            <a:endParaRPr lang="en-US"/>
           </a:p>
         </p:txBody>
       </p:sp>
@@ -1274,7 +1265,7 @@
             <a:fld id="{1D8BD707-D9CF-40AE-B4C6-C98DA3205C09}" type="datetimeFigureOut">
               <a:rPr lang="en-US" smtClean="0"/>
               <a:pPr/>
-              <a:t>9/9/2018</a:t>
+              <a:t>9/16/2018</a:t>
             </a:fld>
             <a:endParaRPr lang="en-US"/>
           </a:p>
@@ -1373,10 +1364,9 @@
           </a:lstStyle>
           <a:p>
             <a:r>
-              <a:rPr lang="en-US" smtClean="0"/>
+              <a:rPr lang="en-US"/>
               <a:t>Click to edit Master title style</a:t>
             </a:r>
-            <a:endParaRPr lang="en-US"/>
           </a:p>
         </p:txBody>
       </p:sp>
@@ -1493,7 +1483,7 @@
           <a:p>
             <a:pPr lvl="0"/>
             <a:r>
-              <a:rPr lang="en-US" smtClean="0"/>
+              <a:rPr lang="en-US"/>
               <a:t>Click to edit Master text styles</a:t>
             </a:r>
           </a:p>
@@ -1517,7 +1507,7 @@
             <a:fld id="{1D8BD707-D9CF-40AE-B4C6-C98DA3205C09}" type="datetimeFigureOut">
               <a:rPr lang="en-US" smtClean="0"/>
               <a:pPr/>
-              <a:t>9/9/2018</a:t>
+              <a:t>9/16/2018</a:t>
             </a:fld>
             <a:endParaRPr lang="en-US"/>
           </a:p>
@@ -1607,10 +1597,9 @@
           <a:lstStyle/>
           <a:p>
             <a:r>
-              <a:rPr lang="en-US" smtClean="0"/>
+              <a:rPr lang="en-US"/>
               <a:t>Click to edit Master title style</a:t>
             </a:r>
-            <a:endParaRPr lang="en-US"/>
           </a:p>
         </p:txBody>
       </p:sp>
@@ -1664,38 +1653,37 @@
           <a:p>
             <a:pPr lvl="0"/>
             <a:r>
-              <a:rPr lang="en-US" smtClean="0"/>
+              <a:rPr lang="en-US"/>
               <a:t>Click to edit Master text styles</a:t>
             </a:r>
           </a:p>
           <a:p>
             <a:pPr lvl="1"/>
             <a:r>
-              <a:rPr lang="en-US" smtClean="0"/>
+              <a:rPr lang="en-US"/>
               <a:t>Second level</a:t>
             </a:r>
           </a:p>
           <a:p>
             <a:pPr lvl="2"/>
             <a:r>
-              <a:rPr lang="en-US" smtClean="0"/>
+              <a:rPr lang="en-US"/>
               <a:t>Third level</a:t>
             </a:r>
           </a:p>
           <a:p>
             <a:pPr lvl="3"/>
             <a:r>
-              <a:rPr lang="en-US" smtClean="0"/>
+              <a:rPr lang="en-US"/>
               <a:t>Fourth level</a:t>
             </a:r>
           </a:p>
           <a:p>
             <a:pPr lvl="4"/>
             <a:r>
-              <a:rPr lang="en-US" smtClean="0"/>
+              <a:rPr lang="en-US"/>
               <a:t>Fifth level</a:t>
             </a:r>
-            <a:endParaRPr lang="en-US"/>
           </a:p>
         </p:txBody>
       </p:sp>
@@ -1749,38 +1737,37 @@
           <a:p>
             <a:pPr lvl="0"/>
             <a:r>
-              <a:rPr lang="en-US" smtClean="0"/>
+              <a:rPr lang="en-US"/>
               <a:t>Click to edit Master text styles</a:t>
             </a:r>
           </a:p>
           <a:p>
             <a:pPr lvl="1"/>
             <a:r>
-              <a:rPr lang="en-US" smtClean="0"/>
+              <a:rPr lang="en-US"/>
               <a:t>Second level</a:t>
             </a:r>
           </a:p>
           <a:p>
             <a:pPr lvl="2"/>
             <a:r>
-              <a:rPr lang="en-US" smtClean="0"/>
+              <a:rPr lang="en-US"/>
               <a:t>Third level</a:t>
             </a:r>
           </a:p>
           <a:p>
             <a:pPr lvl="3"/>
             <a:r>
-              <a:rPr lang="en-US" smtClean="0"/>
+              <a:rPr lang="en-US"/>
               <a:t>Fourth level</a:t>
             </a:r>
           </a:p>
           <a:p>
             <a:pPr lvl="4"/>
             <a:r>
-              <a:rPr lang="en-US" smtClean="0"/>
+              <a:rPr lang="en-US"/>
               <a:t>Fifth level</a:t>
             </a:r>
-            <a:endParaRPr lang="en-US"/>
           </a:p>
         </p:txBody>
       </p:sp>
@@ -1802,7 +1789,7 @@
             <a:fld id="{1D8BD707-D9CF-40AE-B4C6-C98DA3205C09}" type="datetimeFigureOut">
               <a:rPr lang="en-US" smtClean="0"/>
               <a:pPr/>
-              <a:t>9/9/2018</a:t>
+              <a:t>9/16/2018</a:t>
             </a:fld>
             <a:endParaRPr lang="en-US"/>
           </a:p>
@@ -1896,10 +1883,9 @@
           </a:lstStyle>
           <a:p>
             <a:r>
-              <a:rPr lang="en-US" smtClean="0"/>
+              <a:rPr lang="en-US"/>
               <a:t>Click to edit Master title style</a:t>
             </a:r>
-            <a:endParaRPr lang="en-US"/>
           </a:p>
         </p:txBody>
       </p:sp>
@@ -1962,7 +1948,7 @@
           <a:p>
             <a:pPr lvl="0"/>
             <a:r>
-              <a:rPr lang="en-US" smtClean="0"/>
+              <a:rPr lang="en-US"/>
               <a:t>Click to edit Master text styles</a:t>
             </a:r>
           </a:p>
@@ -2018,38 +2004,37 @@
           <a:p>
             <a:pPr lvl="0"/>
             <a:r>
-              <a:rPr lang="en-US" smtClean="0"/>
+              <a:rPr lang="en-US"/>
               <a:t>Click to edit Master text styles</a:t>
             </a:r>
           </a:p>
           <a:p>
             <a:pPr lvl="1"/>
             <a:r>
-              <a:rPr lang="en-US" smtClean="0"/>
+              <a:rPr lang="en-US"/>
               <a:t>Second level</a:t>
             </a:r>
           </a:p>
           <a:p>
             <a:pPr lvl="2"/>
             <a:r>
-              <a:rPr lang="en-US" smtClean="0"/>
+              <a:rPr lang="en-US"/>
               <a:t>Third level</a:t>
             </a:r>
           </a:p>
           <a:p>
             <a:pPr lvl="3"/>
             <a:r>
-              <a:rPr lang="en-US" smtClean="0"/>
+              <a:rPr lang="en-US"/>
               <a:t>Fourth level</a:t>
             </a:r>
           </a:p>
           <a:p>
             <a:pPr lvl="4"/>
             <a:r>
-              <a:rPr lang="en-US" smtClean="0"/>
+              <a:rPr lang="en-US"/>
               <a:t>Fifth level</a:t>
             </a:r>
-            <a:endParaRPr lang="en-US"/>
           </a:p>
         </p:txBody>
       </p:sp>
@@ -2112,7 +2097,7 @@
           <a:p>
             <a:pPr lvl="0"/>
             <a:r>
-              <a:rPr lang="en-US" smtClean="0"/>
+              <a:rPr lang="en-US"/>
               <a:t>Click to edit Master text styles</a:t>
             </a:r>
           </a:p>
@@ -2168,38 +2153,37 @@
           <a:p>
             <a:pPr lvl="0"/>
             <a:r>
-              <a:rPr lang="en-US" smtClean="0"/>
+              <a:rPr lang="en-US"/>
               <a:t>Click to edit Master text styles</a:t>
             </a:r>
           </a:p>
           <a:p>
             <a:pPr lvl="1"/>
             <a:r>
-              <a:rPr lang="en-US" smtClean="0"/>
+              <a:rPr lang="en-US"/>
               <a:t>Second level</a:t>
             </a:r>
           </a:p>
           <a:p>
             <a:pPr lvl="2"/>
             <a:r>
-              <a:rPr lang="en-US" smtClean="0"/>
+              <a:rPr lang="en-US"/>
               <a:t>Third level</a:t>
             </a:r>
           </a:p>
           <a:p>
             <a:pPr lvl="3"/>
             <a:r>
-              <a:rPr lang="en-US" smtClean="0"/>
+              <a:rPr lang="en-US"/>
               <a:t>Fourth level</a:t>
             </a:r>
           </a:p>
           <a:p>
             <a:pPr lvl="4"/>
             <a:r>
-              <a:rPr lang="en-US" smtClean="0"/>
+              <a:rPr lang="en-US"/>
               <a:t>Fifth level</a:t>
             </a:r>
-            <a:endParaRPr lang="en-US"/>
           </a:p>
         </p:txBody>
       </p:sp>
@@ -2221,7 +2205,7 @@
             <a:fld id="{1D8BD707-D9CF-40AE-B4C6-C98DA3205C09}" type="datetimeFigureOut">
               <a:rPr lang="en-US" smtClean="0"/>
               <a:pPr/>
-              <a:t>9/9/2018</a:t>
+              <a:t>9/16/2018</a:t>
             </a:fld>
             <a:endParaRPr lang="en-US"/>
           </a:p>
@@ -2311,10 +2295,9 @@
           <a:lstStyle/>
           <a:p>
             <a:r>
-              <a:rPr lang="en-US" smtClean="0"/>
+              <a:rPr lang="en-US"/>
               <a:t>Click to edit Master title style</a:t>
             </a:r>
-            <a:endParaRPr lang="en-US"/>
           </a:p>
         </p:txBody>
       </p:sp>
@@ -2336,7 +2319,7 @@
             <a:fld id="{1D8BD707-D9CF-40AE-B4C6-C98DA3205C09}" type="datetimeFigureOut">
               <a:rPr lang="en-US" smtClean="0"/>
               <a:pPr/>
-              <a:t>9/9/2018</a:t>
+              <a:t>9/16/2018</a:t>
             </a:fld>
             <a:endParaRPr lang="en-US"/>
           </a:p>
@@ -2428,7 +2411,7 @@
             <a:fld id="{1D8BD707-D9CF-40AE-B4C6-C98DA3205C09}" type="datetimeFigureOut">
               <a:rPr lang="en-US" smtClean="0"/>
               <a:pPr/>
-              <a:t>9/9/2018</a:t>
+              <a:t>9/16/2018</a:t>
             </a:fld>
             <a:endParaRPr lang="en-US"/>
           </a:p>
@@ -2527,10 +2510,9 @@
           </a:lstStyle>
           <a:p>
             <a:r>
-              <a:rPr lang="en-US" smtClean="0"/>
+              <a:rPr lang="en-US"/>
               <a:t>Click to edit Master title style</a:t>
             </a:r>
-            <a:endParaRPr lang="en-US"/>
           </a:p>
         </p:txBody>
       </p:sp>
@@ -2584,38 +2566,37 @@
           <a:p>
             <a:pPr lvl="0"/>
             <a:r>
-              <a:rPr lang="en-US" smtClean="0"/>
+              <a:rPr lang="en-US"/>
               <a:t>Click to edit Master text styles</a:t>
             </a:r>
           </a:p>
           <a:p>
             <a:pPr lvl="1"/>
             <a:r>
-              <a:rPr lang="en-US" smtClean="0"/>
+              <a:rPr lang="en-US"/>
               <a:t>Second level</a:t>
             </a:r>
           </a:p>
           <a:p>
             <a:pPr lvl="2"/>
             <a:r>
-              <a:rPr lang="en-US" smtClean="0"/>
+              <a:rPr lang="en-US"/>
               <a:t>Third level</a:t>
             </a:r>
           </a:p>
           <a:p>
             <a:pPr lvl="3"/>
             <a:r>
-              <a:rPr lang="en-US" smtClean="0"/>
+              <a:rPr lang="en-US"/>
               <a:t>Fourth level</a:t>
             </a:r>
           </a:p>
           <a:p>
             <a:pPr lvl="4"/>
             <a:r>
-              <a:rPr lang="en-US" smtClean="0"/>
+              <a:rPr lang="en-US"/>
               <a:t>Fifth level</a:t>
             </a:r>
-            <a:endParaRPr lang="en-US"/>
           </a:p>
         </p:txBody>
       </p:sp>
@@ -2678,7 +2659,7 @@
           <a:p>
             <a:pPr lvl="0"/>
             <a:r>
-              <a:rPr lang="en-US" smtClean="0"/>
+              <a:rPr lang="en-US"/>
               <a:t>Click to edit Master text styles</a:t>
             </a:r>
           </a:p>
@@ -2702,7 +2683,7 @@
             <a:fld id="{1D8BD707-D9CF-40AE-B4C6-C98DA3205C09}" type="datetimeFigureOut">
               <a:rPr lang="en-US" smtClean="0"/>
               <a:pPr/>
-              <a:t>9/9/2018</a:t>
+              <a:t>9/16/2018</a:t>
             </a:fld>
             <a:endParaRPr lang="en-US"/>
           </a:p>
@@ -2801,10 +2782,9 @@
           </a:lstStyle>
           <a:p>
             <a:r>
-              <a:rPr lang="en-US" smtClean="0"/>
+              <a:rPr lang="en-US"/>
               <a:t>Click to edit Master title style</a:t>
             </a:r>
-            <a:endParaRPr lang="en-US"/>
           </a:p>
         </p:txBody>
       </p:sp>
@@ -2928,7 +2908,7 @@
           <a:p>
             <a:pPr lvl="0"/>
             <a:r>
-              <a:rPr lang="en-US" smtClean="0"/>
+              <a:rPr lang="en-US"/>
               <a:t>Click to edit Master text styles</a:t>
             </a:r>
           </a:p>
@@ -2952,7 +2932,7 @@
             <a:fld id="{1D8BD707-D9CF-40AE-B4C6-C98DA3205C09}" type="datetimeFigureOut">
               <a:rPr lang="en-US" smtClean="0"/>
               <a:pPr/>
-              <a:t>9/9/2018</a:t>
+              <a:t>9/16/2018</a:t>
             </a:fld>
             <a:endParaRPr lang="en-US"/>
           </a:p>
@@ -3057,10 +3037,9 @@
           <a:lstStyle/>
           <a:p>
             <a:r>
-              <a:rPr lang="en-US" smtClean="0"/>
+              <a:rPr lang="en-US"/>
               <a:t>Click to edit Master title style</a:t>
             </a:r>
-            <a:endParaRPr lang="en-US"/>
           </a:p>
         </p:txBody>
       </p:sp>
@@ -3091,38 +3070,37 @@
           <a:p>
             <a:pPr lvl="0"/>
             <a:r>
-              <a:rPr lang="en-US" smtClean="0"/>
+              <a:rPr lang="en-US"/>
               <a:t>Click to edit Master text styles</a:t>
             </a:r>
           </a:p>
           <a:p>
             <a:pPr lvl="1"/>
             <a:r>
-              <a:rPr lang="en-US" smtClean="0"/>
+              <a:rPr lang="en-US"/>
               <a:t>Second level</a:t>
             </a:r>
           </a:p>
           <a:p>
             <a:pPr lvl="2"/>
             <a:r>
-              <a:rPr lang="en-US" smtClean="0"/>
+              <a:rPr lang="en-US"/>
               <a:t>Third level</a:t>
             </a:r>
           </a:p>
           <a:p>
             <a:pPr lvl="3"/>
             <a:r>
-              <a:rPr lang="en-US" smtClean="0"/>
+              <a:rPr lang="en-US"/>
               <a:t>Fourth level</a:t>
             </a:r>
           </a:p>
           <a:p>
             <a:pPr lvl="4"/>
             <a:r>
-              <a:rPr lang="en-US" smtClean="0"/>
+              <a:rPr lang="en-US"/>
               <a:t>Fifth level</a:t>
             </a:r>
-            <a:endParaRPr lang="en-US"/>
           </a:p>
         </p:txBody>
       </p:sp>
@@ -3162,7 +3140,7 @@
             <a:fld id="{1D8BD707-D9CF-40AE-B4C6-C98DA3205C09}" type="datetimeFigureOut">
               <a:rPr lang="en-US" smtClean="0"/>
               <a:pPr/>
-              <a:t>9/9/2018</a:t>
+              <a:t>9/16/2018</a:t>
             </a:fld>
             <a:endParaRPr lang="en-US"/>
           </a:p>
@@ -3581,7 +3559,7 @@
           <a:p>
             <a:pPr algn="ctr"/>
             <a:r>
-              <a:rPr lang="en-US" sz="4800" b="1" dirty="0" smtClean="0">
+              <a:rPr lang="en-US" sz="4800" b="1" dirty="0">
                 <a:latin typeface="+mj-lt"/>
                 <a:cs typeface="Times New Roman" pitchFamily="18" charset="0"/>
               </a:rPr>
@@ -3703,19 +3681,8 @@
                 <a:latin typeface="+mj-lt"/>
                 <a:cs typeface="Times New Roman" pitchFamily="18" charset="0"/>
               </a:rPr>
-              <a:t>Reza </a:t>
-            </a:r>
-            <a:r>
-              <a:rPr lang="en-US" sz="2000" dirty="0" smtClean="0">
-                <a:latin typeface="+mj-lt"/>
-                <a:cs typeface="Times New Roman" pitchFamily="18" charset="0"/>
-              </a:rPr>
-              <a:t>Dibaj</a:t>
-            </a:r>
-            <a:endParaRPr lang="en-US" sz="2000" dirty="0">
-              <a:latin typeface="+mj-lt"/>
-              <a:cs typeface="Times New Roman" pitchFamily="18" charset="0"/>
-            </a:endParaRPr>
+              <a:t>Reza Dibaj</a:t>
+            </a:r>
           </a:p>
         </p:txBody>
       </p:sp>
@@ -3810,13 +3777,6 @@
       </p:transition>
     </mc:Fallback>
   </mc:AlternateContent>
-  <p:timing>
-    <p:tnLst>
-      <p:par>
-        <p:cTn id="1" dur="indefinite" restart="never" nodeType="tmRoot"/>
-      </p:par>
-    </p:tnLst>
-  </p:timing>
 </p:sld>
 </file>
 
@@ -3913,11 +3873,11 @@
           <a:lstStyle/>
           <a:p>
             <a:r>
-              <a:rPr lang="en-CA" sz="1600" b="1" dirty="0" err="1" smtClean="0"/>
+              <a:rPr lang="en-CA" sz="1600" b="1" dirty="0" err="1"/>
               <a:t>IaaS</a:t>
             </a:r>
             <a:r>
-              <a:rPr lang="en-CA" sz="1600" b="1" dirty="0" smtClean="0"/>
+              <a:rPr lang="en-CA" sz="1600" b="1" dirty="0"/>
               <a:t> Companies:</a:t>
             </a:r>
             <a:endParaRPr lang="en-CA" sz="1600" dirty="0">
@@ -3932,7 +3892,7 @@
               <a:buChar char="•"/>
             </a:pPr>
             <a:r>
-              <a:rPr lang="en-CA" sz="1600" dirty="0" smtClean="0"/>
+              <a:rPr lang="en-CA" sz="1600" dirty="0"/>
               <a:t>Amazon</a:t>
             </a:r>
           </a:p>
@@ -3942,7 +3902,7 @@
               <a:buChar char="ü"/>
             </a:pPr>
             <a:r>
-              <a:rPr lang="en-CA" sz="1600" dirty="0" smtClean="0"/>
+              <a:rPr lang="en-CA" sz="1600" dirty="0"/>
               <a:t>Offers a number of Cloud Hosting products which can be rented based on customers’ hourly usage</a:t>
             </a:r>
           </a:p>
@@ -3951,7 +3911,7 @@
               <a:buFont typeface="Wingdings" panose="05000000000000000000" pitchFamily="2" charset="2"/>
               <a:buChar char="ü"/>
             </a:pPr>
-            <a:endParaRPr lang="en-CA" sz="1600" dirty="0" smtClean="0"/>
+            <a:endParaRPr lang="en-CA" sz="1600" dirty="0"/>
           </a:p>
           <a:p>
             <a:pPr marL="285750" indent="-285750">
@@ -3971,11 +3931,7 @@
             </a:pPr>
             <a:r>
               <a:rPr lang="en-CA" sz="1600" dirty="0"/>
-              <a:t>Offers all four hosting </a:t>
-            </a:r>
-            <a:r>
-              <a:rPr lang="en-CA" sz="1600" dirty="0" smtClean="0"/>
-              <a:t>categories</a:t>
+              <a:t>Offers all four hosting categories</a:t>
             </a:r>
           </a:p>
           <a:p>
@@ -3991,7 +3947,7 @@
               <a:buChar char="•"/>
             </a:pPr>
             <a:r>
-              <a:rPr lang="en-CA" sz="1600" dirty="0" err="1" smtClean="0"/>
+              <a:rPr lang="en-CA" sz="1600" dirty="0" err="1"/>
               <a:t>Gogrid</a:t>
             </a:r>
             <a:endParaRPr lang="en-CA" sz="1600" dirty="0"/>
@@ -4003,13 +3959,8 @@
             </a:pPr>
             <a:r>
               <a:rPr lang="en-CA" sz="1600" dirty="0"/>
-              <a:t>Offers </a:t>
-            </a:r>
-            <a:r>
-              <a:rPr lang="en-CA" sz="1600" dirty="0" smtClean="0"/>
-              <a:t>Cloud Hosting, Hybrid Hosting, and Dedicated Hosting solutions.</a:t>
-            </a:r>
-            <a:endParaRPr lang="en-CA" sz="1600" dirty="0"/>
+              <a:t>Offers Cloud Hosting, Hybrid Hosting, and Dedicated Hosting solutions.</a:t>
+            </a:r>
           </a:p>
           <a:p>
             <a:pPr marL="285750" indent="-285750">
@@ -4156,13 +4107,6 @@
   <p:transition spd="slow">
     <p:cover/>
   </p:transition>
-  <p:timing>
-    <p:tnLst>
-      <p:par>
-        <p:cTn id="1" dur="indefinite" restart="never" nodeType="tmRoot"/>
-      </p:par>
-    </p:tnLst>
-  </p:timing>
 </p:sld>
 </file>
 
@@ -4259,15 +4203,15 @@
           <a:lstStyle/>
           <a:p>
             <a:r>
-              <a:rPr lang="en-US" sz="1600" b="1" dirty="0" smtClean="0"/>
+              <a:rPr lang="en-US" sz="1600" b="1" dirty="0"/>
               <a:t>Today’s Infrastructure as a Service (</a:t>
             </a:r>
             <a:r>
-              <a:rPr lang="en-US" sz="1600" b="1" dirty="0" err="1" smtClean="0"/>
+              <a:rPr lang="en-US" sz="1600" b="1" dirty="0" err="1"/>
               <a:t>IaaS</a:t>
             </a:r>
             <a:r>
-              <a:rPr lang="en-US" sz="1600" b="1" dirty="0" smtClean="0"/>
+              <a:rPr lang="en-US" sz="1600" b="1" dirty="0"/>
               <a:t>) from the Cloud Perspective</a:t>
             </a:r>
           </a:p>
@@ -4277,15 +4221,15 @@
               <a:buChar char="•"/>
             </a:pPr>
             <a:r>
-              <a:rPr lang="en-CA" sz="1600" dirty="0" smtClean="0"/>
+              <a:rPr lang="en-CA" sz="1600" dirty="0"/>
               <a:t>Storage Infrastructure: Should be highly available, using </a:t>
             </a:r>
             <a:r>
-              <a:rPr lang="en-CA" sz="1600" dirty="0" err="1" smtClean="0"/>
+              <a:rPr lang="en-CA" sz="1600" dirty="0" err="1"/>
               <a:t>Rade</a:t>
             </a:r>
             <a:r>
-              <a:rPr lang="en-CA" sz="1600" dirty="0" smtClean="0"/>
+              <a:rPr lang="en-CA" sz="1600" dirty="0"/>
               <a:t> and number of other high available technologies</a:t>
             </a:r>
           </a:p>
@@ -4295,24 +4239,8 @@
               <a:buChar char="•"/>
             </a:pPr>
             <a:r>
-              <a:rPr lang="en-CA" sz="1600" dirty="0" smtClean="0"/>
-              <a:t>Network Infrastructure: </a:t>
-            </a:r>
-            <a:r>
-              <a:rPr lang="en-CA" sz="1600" dirty="0"/>
-              <a:t>Should be highly </a:t>
-            </a:r>
-            <a:r>
-              <a:rPr lang="en-CA" sz="1600" dirty="0" smtClean="0"/>
-              <a:t>available, using multi-link and number </a:t>
-            </a:r>
-            <a:r>
-              <a:rPr lang="en-CA" sz="1600" dirty="0"/>
-              <a:t>of other high available </a:t>
-            </a:r>
-            <a:r>
-              <a:rPr lang="en-CA" sz="1600" dirty="0" smtClean="0"/>
-              <a:t>technologies</a:t>
+              <a:rPr lang="en-CA" sz="1600" dirty="0"/>
+              <a:t>Network Infrastructure: Should be highly available, using multi-link and number of other high available technologies</a:t>
             </a:r>
           </a:p>
           <a:p>
@@ -4321,11 +4249,11 @@
               <a:buChar char="•"/>
             </a:pPr>
             <a:r>
-              <a:rPr lang="en-CA" sz="1600" dirty="0" err="1" smtClean="0"/>
+              <a:rPr lang="en-CA" sz="1600" dirty="0" err="1"/>
               <a:t>vCenter</a:t>
             </a:r>
             <a:r>
-              <a:rPr lang="en-CA" sz="1600" dirty="0" smtClean="0"/>
+              <a:rPr lang="en-CA" sz="1600" dirty="0"/>
               <a:t> Infrastructure: This part is responsible to manage the virtual machines</a:t>
             </a:r>
           </a:p>
@@ -4335,20 +4263,12 @@
               <a:buChar char="•"/>
             </a:pPr>
             <a:r>
-              <a:rPr lang="en-CA" sz="1600" dirty="0" err="1" smtClean="0"/>
+              <a:rPr lang="en-CA" sz="1600" dirty="0" err="1"/>
               <a:t>vCloud</a:t>
             </a:r>
             <a:r>
-              <a:rPr lang="en-CA" sz="1600" dirty="0" smtClean="0"/>
-              <a:t> </a:t>
-            </a:r>
-            <a:r>
-              <a:rPr lang="en-CA" sz="1600" dirty="0"/>
-              <a:t>Infrastructure </a:t>
-            </a:r>
-            <a:r>
-              <a:rPr lang="en-CA" sz="1600" dirty="0" smtClean="0"/>
-              <a:t>: This is to manage Cloud that contains different customers, virtual machines that shape a specific business or function</a:t>
+              <a:rPr lang="en-CA" sz="1600" dirty="0"/>
+              <a:t> Infrastructure : This is to manage Cloud that contains different customers, virtual machines that shape a specific business or function</a:t>
             </a:r>
           </a:p>
           <a:p>
@@ -4357,11 +4277,11 @@
               <a:buChar char="•"/>
             </a:pPr>
             <a:r>
-              <a:rPr lang="en-CA" sz="1600" dirty="0" err="1" smtClean="0"/>
+              <a:rPr lang="en-CA" sz="1600" dirty="0" err="1"/>
               <a:t>vApps</a:t>
             </a:r>
             <a:r>
-              <a:rPr lang="en-CA" sz="1600" dirty="0" smtClean="0"/>
+              <a:rPr lang="en-CA" sz="1600" dirty="0"/>
               <a:t> Infrastructure: This is the way of building the applications whether it is new or a legacy application </a:t>
             </a:r>
           </a:p>
@@ -4371,7 +4291,7 @@
               <a:buChar char="•"/>
             </a:pPr>
             <a:r>
-              <a:rPr lang="en-CA" sz="1600" dirty="0" smtClean="0"/>
+              <a:rPr lang="en-CA" sz="1600" dirty="0"/>
               <a:t>In this approach the expectation is the infrastructure should be always available for the applications</a:t>
             </a:r>
           </a:p>
@@ -4384,19 +4304,18 @@
           </a:p>
           <a:p>
             <a:r>
-              <a:rPr lang="en-CA" sz="1600" dirty="0" smtClean="0"/>
+              <a:rPr lang="en-CA" sz="1600" dirty="0"/>
               <a:t>The examples for this approach is VMware, Citrix, and many more </a:t>
             </a:r>
+          </a:p>
+          <a:p>
             <a:endParaRPr lang="en-CA" sz="1600" dirty="0"/>
           </a:p>
           <a:p>
-            <a:endParaRPr lang="en-CA" sz="1600" dirty="0" smtClean="0"/>
-          </a:p>
-          <a:p>
-            <a:endParaRPr lang="en-CA" sz="1600" dirty="0" smtClean="0"/>
-          </a:p>
-          <a:p>
-            <a:endParaRPr lang="en-CA" sz="1600" dirty="0" smtClean="0"/>
+            <a:endParaRPr lang="en-CA" sz="1600" dirty="0"/>
+          </a:p>
+          <a:p>
+            <a:endParaRPr lang="en-CA" sz="1600" dirty="0"/>
           </a:p>
         </p:txBody>
       </p:sp>
@@ -4413,13 +4332,6 @@
   <p:transition spd="slow">
     <p:cover/>
   </p:transition>
-  <p:timing>
-    <p:tnLst>
-      <p:par>
-        <p:cTn id="1" dur="indefinite" restart="never" nodeType="tmRoot"/>
-      </p:par>
-    </p:tnLst>
-  </p:timing>
 </p:sld>
 </file>
 
@@ -4516,11 +4428,11 @@
           <a:lstStyle/>
           <a:p>
             <a:r>
-              <a:rPr lang="en-US" sz="1600" b="1" dirty="0" err="1" smtClean="0"/>
+              <a:rPr lang="en-US" sz="1600" b="1" dirty="0" err="1"/>
               <a:t>OpenStack</a:t>
             </a:r>
             <a:r>
-              <a:rPr lang="en-US" sz="1600" b="1" dirty="0" smtClean="0"/>
+              <a:rPr lang="en-US" sz="1600" b="1" dirty="0"/>
               <a:t> Infrastructure as a Service</a:t>
             </a:r>
           </a:p>
@@ -4530,11 +4442,11 @@
               <a:buChar char="•"/>
             </a:pPr>
             <a:r>
-              <a:rPr lang="en-CA" sz="1600" dirty="0" err="1" smtClean="0"/>
+              <a:rPr lang="en-CA" sz="1600" dirty="0" err="1"/>
               <a:t>OpenStack</a:t>
             </a:r>
             <a:r>
-              <a:rPr lang="en-CA" sz="1600" dirty="0" smtClean="0"/>
+              <a:rPr lang="en-CA" sz="1600" dirty="0"/>
               <a:t> is completely open-source and community-based</a:t>
             </a:r>
           </a:p>
@@ -4544,15 +4456,15 @@
               <a:buChar char="•"/>
             </a:pPr>
             <a:r>
-              <a:rPr lang="en-CA" sz="1600" dirty="0" smtClean="0"/>
+              <a:rPr lang="en-CA" sz="1600" dirty="0"/>
               <a:t>It is not built-on legacy application, but web applications, </a:t>
             </a:r>
             <a:r>
-              <a:rPr lang="en-CA" sz="1600" dirty="0" err="1" smtClean="0"/>
+              <a:rPr lang="en-CA" sz="1600" dirty="0" err="1"/>
               <a:t>BigData</a:t>
             </a:r>
             <a:r>
-              <a:rPr lang="en-CA" sz="1600" dirty="0" smtClean="0"/>
+              <a:rPr lang="en-CA" sz="1600" dirty="0"/>
               <a:t> applications, and Cloud applications </a:t>
             </a:r>
           </a:p>
@@ -4562,7 +4474,7 @@
               <a:buChar char="ü"/>
             </a:pPr>
             <a:r>
-              <a:rPr lang="en-CA" sz="1600" dirty="0" smtClean="0"/>
+              <a:rPr lang="en-CA" sz="1600" dirty="0"/>
               <a:t>These are the applications that automatically scale up, or scale down</a:t>
             </a:r>
           </a:p>
@@ -4572,7 +4484,7 @@
               <a:buChar char="ü"/>
             </a:pPr>
             <a:r>
-              <a:rPr lang="en-CA" sz="1600" dirty="0" smtClean="0"/>
+              <a:rPr lang="en-CA" sz="1600" dirty="0"/>
               <a:t>These applications know how to deal with infrastructures that may not be highly available as we experienced in the traditional Cloud Environments (Designed to fail!)</a:t>
             </a:r>
           </a:p>
@@ -4582,7 +4494,7 @@
               <a:buChar char="ü"/>
             </a:pPr>
             <a:r>
-              <a:rPr lang="en-CA" sz="1600" dirty="0" smtClean="0"/>
+              <a:rPr lang="en-CA" sz="1600" dirty="0"/>
               <a:t>Some name these new generation applications as “Intelligent Applications” which is really appropriate</a:t>
             </a:r>
           </a:p>
@@ -4592,11 +4504,11 @@
               <a:buChar char="•"/>
             </a:pPr>
             <a:r>
-              <a:rPr lang="en-CA" sz="1600" dirty="0" err="1" smtClean="0"/>
+              <a:rPr lang="en-CA" sz="1600" dirty="0" err="1"/>
               <a:t>OpenStack’s</a:t>
             </a:r>
             <a:r>
-              <a:rPr lang="en-CA" sz="1600" dirty="0" smtClean="0"/>
+              <a:rPr lang="en-CA" sz="1600" dirty="0"/>
               <a:t> Main Components:</a:t>
             </a:r>
           </a:p>
@@ -4606,7 +4518,7 @@
               <a:buChar char="ü"/>
             </a:pPr>
             <a:r>
-              <a:rPr lang="en-CA" sz="1600" dirty="0" smtClean="0"/>
+              <a:rPr lang="en-CA" sz="1600" dirty="0"/>
               <a:t>Glance: Name of a project for image repository and keeps track of ISO, and all we need to put together and build an application</a:t>
             </a:r>
           </a:p>
@@ -4616,7 +4528,7 @@
               <a:buChar char="ü"/>
             </a:pPr>
             <a:r>
-              <a:rPr lang="en-CA" sz="1600" dirty="0" smtClean="0"/>
+              <a:rPr lang="en-CA" sz="1600" dirty="0"/>
               <a:t>Nova: Name of a project that focuses on the compute layer for commodity or any x86 platform to be able to boot, load images and compute functions </a:t>
             </a:r>
           </a:p>
@@ -4626,16 +4538,8 @@
               <a:buChar char="ü"/>
             </a:pPr>
             <a:r>
-              <a:rPr lang="en-CA" sz="1600" dirty="0" smtClean="0"/>
-              <a:t>SWIFT: </a:t>
-            </a:r>
-            <a:r>
-              <a:rPr lang="en-CA" sz="1600" dirty="0"/>
-              <a:t>Name of a project that </a:t>
-            </a:r>
-            <a:r>
-              <a:rPr lang="en-CA" sz="1600" dirty="0" smtClean="0"/>
-              <a:t>supports object-based storage data</a:t>
+              <a:rPr lang="en-CA" sz="1600" dirty="0"/>
+              <a:t>SWIFT: Name of a project that supports object-based storage data</a:t>
             </a:r>
           </a:p>
           <a:p>
@@ -4644,39 +4548,31 @@
               <a:buChar char="ü"/>
             </a:pPr>
             <a:r>
-              <a:rPr lang="en-CA" sz="1600" dirty="0" smtClean="0"/>
-              <a:t>Quantum: </a:t>
-            </a:r>
-            <a:r>
-              <a:rPr lang="en-CA" sz="1600" dirty="0"/>
-              <a:t>Name of a project that supports </a:t>
-            </a:r>
-            <a:r>
-              <a:rPr lang="en-CA" sz="1600" dirty="0" smtClean="0"/>
-              <a:t>network services in the </a:t>
-            </a:r>
-            <a:r>
-              <a:rPr lang="en-CA" sz="1600" dirty="0" err="1" smtClean="0"/>
+              <a:rPr lang="en-CA" sz="1600" dirty="0"/>
+              <a:t>Quantum: Name of a project that supports network services in the </a:t>
+            </a:r>
+            <a:r>
+              <a:rPr lang="en-CA" sz="1600" dirty="0" err="1"/>
               <a:t>OpenStack</a:t>
             </a:r>
-            <a:endParaRPr lang="en-CA" sz="1600" dirty="0" smtClean="0"/>
+            <a:endParaRPr lang="en-CA" sz="1600" dirty="0"/>
           </a:p>
           <a:p>
             <a:pPr marL="1200150" lvl="2" indent="-285750">
               <a:buFont typeface="Wingdings" panose="05000000000000000000" pitchFamily="2" charset="2"/>
               <a:buChar char="ü"/>
             </a:pPr>
-            <a:endParaRPr lang="en-CA" sz="1600" dirty="0" smtClean="0"/>
+            <a:endParaRPr lang="en-CA" sz="1600" dirty="0"/>
           </a:p>
           <a:p>
             <a:pPr marL="1200150" lvl="2" indent="-285750">
               <a:buFont typeface="Wingdings" panose="05000000000000000000" pitchFamily="2" charset="2"/>
               <a:buChar char="ü"/>
             </a:pPr>
-            <a:endParaRPr lang="en-CA" sz="1600" dirty="0" smtClean="0"/>
-          </a:p>
-          <a:p>
-            <a:endParaRPr lang="en-CA" sz="1600" dirty="0" smtClean="0"/>
+            <a:endParaRPr lang="en-CA" sz="1600" dirty="0"/>
+          </a:p>
+          <a:p>
+            <a:endParaRPr lang="en-CA" sz="1600" dirty="0"/>
           </a:p>
         </p:txBody>
       </p:sp>
@@ -4693,13 +4589,6 @@
   <p:transition spd="slow">
     <p:cover/>
   </p:transition>
-  <p:timing>
-    <p:tnLst>
-      <p:par>
-        <p:cTn id="1" dur="indefinite" restart="never" nodeType="tmRoot"/>
-      </p:par>
-    </p:tnLst>
-  </p:timing>
 </p:sld>
 </file>
 
@@ -4829,11 +4718,7 @@
             </a:r>
             <a:r>
               <a:rPr lang="en-CA" sz="1600" dirty="0"/>
-              <a:t> and NASA. Its mission is to enable any organization regardless of size to create and offer cloud computing servers running on standardized hardware</a:t>
-            </a:r>
-            <a:r>
-              <a:rPr lang="en-CA" sz="1600" dirty="0" smtClean="0"/>
-              <a:t>.</a:t>
+              <a:t> and NASA. Its mission is to enable any organization regardless of size to create and offer cloud computing servers running on standardized hardware.</a:t>
             </a:r>
           </a:p>
         </p:txBody>
@@ -4851,13 +4736,6 @@
   <p:transition spd="slow">
     <p:cover/>
   </p:transition>
-  <p:timing>
-    <p:tnLst>
-      <p:par>
-        <p:cTn id="1" dur="indefinite" restart="never" nodeType="tmRoot"/>
-      </p:par>
-    </p:tnLst>
-  </p:timing>
 </p:sld>
 </file>
 
@@ -4954,11 +4832,11 @@
           <a:lstStyle/>
           <a:p>
             <a:r>
-              <a:rPr lang="en-US" sz="1600" b="1" dirty="0" smtClean="0"/>
+              <a:rPr lang="en-US" sz="1600" b="1" dirty="0"/>
               <a:t>Who supports </a:t>
             </a:r>
             <a:r>
-              <a:rPr lang="en-US" sz="1600" b="1" dirty="0" err="1" smtClean="0"/>
+              <a:rPr lang="en-US" sz="1600" b="1" dirty="0" err="1"/>
               <a:t>OpenStack</a:t>
             </a:r>
             <a:r>
@@ -4977,21 +4855,16 @@
             </a:r>
             <a:r>
               <a:rPr lang="en-CA" sz="1600" dirty="0"/>
-              <a:t> had 6700 members in over 83 countries</a:t>
-            </a:r>
-            <a:r>
-              <a:rPr lang="en-CA" sz="1600" dirty="0" smtClean="0"/>
-              <a:t>. Developers contribute to different projects with </a:t>
-            </a:r>
-            <a:r>
-              <a:rPr lang="en-CA" sz="1600" dirty="0" err="1" smtClean="0"/>
+              <a:t> had 6700 members in over 83 countries. Developers contribute to different projects with </a:t>
+            </a:r>
+            <a:r>
+              <a:rPr lang="en-CA" sz="1600" dirty="0" err="1"/>
               <a:t>OpenStack</a:t>
             </a:r>
             <a:r>
-              <a:rPr lang="en-CA" sz="1600" dirty="0" smtClean="0"/>
+              <a:rPr lang="en-CA" sz="1600" dirty="0"/>
               <a:t> primarily in Python, that is freely available under the Apache 2.0 license. </a:t>
             </a:r>
-            <a:endParaRPr lang="en-CA" sz="1600" dirty="0"/>
           </a:p>
           <a:p>
             <a:r>
@@ -4999,14 +4872,13 @@
               <a:t>There are some of the teams and technologies that support </a:t>
             </a:r>
             <a:r>
-              <a:rPr lang="en-CA" sz="1600" dirty="0" err="1" smtClean="0"/>
+              <a:rPr lang="en-CA" sz="1600" dirty="0" err="1"/>
               <a:t>OpenStack</a:t>
             </a:r>
             <a:r>
               <a:rPr lang="en-CA" sz="1600" dirty="0"/>
               <a:t>.</a:t>
             </a:r>
-            <a:endParaRPr lang="en-CA" sz="1600" dirty="0" smtClean="0"/>
           </a:p>
         </p:txBody>
       </p:sp>
@@ -5077,13 +4949,6 @@
   <p:transition spd="slow">
     <p:cover/>
   </p:transition>
-  <p:timing>
-    <p:tnLst>
-      <p:par>
-        <p:cTn id="1" dur="indefinite" restart="never" nodeType="tmRoot"/>
-      </p:par>
-    </p:tnLst>
-  </p:timing>
 </p:sld>
 </file>
 
@@ -5180,15 +5045,15 @@
           <a:lstStyle/>
           <a:p>
             <a:r>
-              <a:rPr lang="en-US" sz="1600" b="1" dirty="0" smtClean="0"/>
+              <a:rPr lang="en-US" sz="1600" b="1" dirty="0"/>
               <a:t>What are people doing with </a:t>
             </a:r>
             <a:r>
-              <a:rPr lang="en-US" sz="1600" b="1" dirty="0" err="1" smtClean="0"/>
+              <a:rPr lang="en-US" sz="1600" b="1" dirty="0" err="1"/>
               <a:t>OpenStack</a:t>
             </a:r>
             <a:r>
-              <a:rPr lang="en-US" sz="1600" b="1" dirty="0" smtClean="0"/>
+              <a:rPr lang="en-US" sz="1600" b="1" dirty="0"/>
               <a:t>?</a:t>
             </a:r>
           </a:p>
@@ -5198,7 +5063,7 @@
               <a:buChar char="•"/>
             </a:pPr>
             <a:r>
-              <a:rPr lang="en-US" sz="1600" b="1" dirty="0" smtClean="0"/>
+              <a:rPr lang="en-US" sz="1600" b="1" dirty="0"/>
               <a:t>Research Institutions</a:t>
             </a:r>
           </a:p>
@@ -5208,7 +5073,7 @@
               <a:buChar char="•"/>
             </a:pPr>
             <a:r>
-              <a:rPr lang="en-US" sz="1600" b="1" dirty="0" smtClean="0"/>
+              <a:rPr lang="en-US" sz="1600" b="1" dirty="0"/>
               <a:t>Government Agencies</a:t>
             </a:r>
           </a:p>
@@ -5218,7 +5083,7 @@
               <a:buChar char="•"/>
             </a:pPr>
             <a:r>
-              <a:rPr lang="en-US" sz="1600" b="1" dirty="0" smtClean="0"/>
+              <a:rPr lang="en-US" sz="1600" b="1" dirty="0"/>
               <a:t>Financial Institutions</a:t>
             </a:r>
           </a:p>
@@ -5228,7 +5093,7 @@
               <a:buChar char="•"/>
             </a:pPr>
             <a:r>
-              <a:rPr lang="en-US" sz="1600" b="1" dirty="0" smtClean="0"/>
+              <a:rPr lang="en-US" sz="1600" b="1" dirty="0"/>
               <a:t>Biomedical Research Companies</a:t>
             </a:r>
           </a:p>
@@ -5238,12 +5103,12 @@
               <a:buChar char="•"/>
             </a:pPr>
             <a:r>
-              <a:rPr lang="en-US" sz="1600" b="1" dirty="0" smtClean="0"/>
+              <a:rPr lang="en-US" sz="1600" b="1" dirty="0"/>
               <a:t>Ecommerce Companies</a:t>
             </a:r>
           </a:p>
           <a:p>
-            <a:endParaRPr lang="en-US" sz="1600" b="1" dirty="0" smtClean="0"/>
+            <a:endParaRPr lang="en-US" sz="1600" b="1" dirty="0"/>
           </a:p>
         </p:txBody>
       </p:sp>
@@ -5260,13 +5125,6 @@
   <p:transition spd="slow">
     <p:cover/>
   </p:transition>
-  <p:timing>
-    <p:tnLst>
-      <p:par>
-        <p:cTn id="1" dur="indefinite" restart="never" nodeType="tmRoot"/>
-      </p:par>
-    </p:tnLst>
-  </p:timing>
 </p:sld>
 </file>
 
@@ -5363,34 +5221,33 @@
           <a:lstStyle/>
           <a:p>
             <a:r>
-              <a:rPr lang="en-US" sz="1600" b="1" dirty="0" smtClean="0"/>
+              <a:rPr lang="en-US" sz="1600" b="1" dirty="0"/>
               <a:t>Why Switching to </a:t>
             </a:r>
             <a:r>
-              <a:rPr lang="en-US" sz="1600" b="1" dirty="0" err="1" smtClean="0"/>
+              <a:rPr lang="en-US" sz="1600" b="1" dirty="0" err="1"/>
               <a:t>OpenStack</a:t>
             </a:r>
             <a:r>
-              <a:rPr lang="en-US" sz="1600" b="1" dirty="0" smtClean="0"/>
+              <a:rPr lang="en-US" sz="1600" b="1" dirty="0"/>
               <a:t>?</a:t>
             </a:r>
           </a:p>
           <a:p>
             <a:r>
-              <a:rPr lang="en-US" sz="1600" b="1" dirty="0" smtClean="0"/>
+              <a:rPr lang="en-US" sz="1600" b="1" dirty="0"/>
               <a:t>Companies demands for more resources</a:t>
             </a:r>
-            <a:endParaRPr lang="en-US" sz="1600" b="1" dirty="0"/>
-          </a:p>
-          <a:p>
-            <a:r>
-              <a:rPr lang="en-CA" sz="1600" dirty="0" smtClean="0"/>
+          </a:p>
+          <a:p>
+            <a:r>
+              <a:rPr lang="en-CA" sz="1600" dirty="0"/>
               <a:t>For many years developers provide applications and point to them in the dedicated servers. </a:t>
             </a:r>
           </a:p>
           <a:p>
             <a:r>
-              <a:rPr lang="en-CA" sz="1600" dirty="0" smtClean="0"/>
+              <a:rPr lang="en-CA" sz="1600" dirty="0"/>
               <a:t>Adding more applications required more servers, and each server needs more RAM, bigger Hard Drives, and added CPUs.  That made a huge amount of troubles for the companies dealing with different servers, include racking, stacking, configuring and networking those servers. </a:t>
             </a:r>
           </a:p>
@@ -5450,13 +5307,6 @@
   <p:transition spd="slow">
     <p:cover/>
   </p:transition>
-  <p:timing>
-    <p:tnLst>
-      <p:par>
-        <p:cTn id="1" dur="indefinite" restart="never" nodeType="tmRoot"/>
-      </p:par>
-    </p:tnLst>
-  </p:timing>
 </p:sld>
 </file>
 
@@ -5553,35 +5403,33 @@
           <a:lstStyle/>
           <a:p>
             <a:r>
-              <a:rPr lang="en-US" sz="1600" b="1" dirty="0" smtClean="0"/>
+              <a:rPr lang="en-US" sz="1600" b="1" dirty="0"/>
               <a:t>Why Switching to </a:t>
             </a:r>
             <a:r>
-              <a:rPr lang="en-US" sz="1600" b="1" dirty="0" err="1" smtClean="0"/>
+              <a:rPr lang="en-US" sz="1600" b="1" dirty="0" err="1"/>
               <a:t>OpenStack</a:t>
             </a:r>
             <a:r>
-              <a:rPr lang="en-US" sz="1600" b="1" dirty="0" smtClean="0"/>
+              <a:rPr lang="en-US" sz="1600" b="1" dirty="0"/>
               <a:t>?</a:t>
             </a:r>
           </a:p>
           <a:p>
             <a:r>
-              <a:rPr lang="en-US" sz="1600" b="1" dirty="0" smtClean="0"/>
+              <a:rPr lang="en-US" sz="1600" b="1" dirty="0"/>
               <a:t>Hypervisor: The first attempt towards virtualization</a:t>
             </a:r>
-            <a:endParaRPr lang="en-US" sz="1600" b="1" dirty="0"/>
-          </a:p>
-          <a:p>
-            <a:r>
-              <a:rPr lang="en-CA" sz="1600" dirty="0" smtClean="0"/>
+          </a:p>
+          <a:p>
+            <a:r>
+              <a:rPr lang="en-CA" sz="1600" dirty="0"/>
               <a:t>In the last decade virtualization came to market to cover some of these problems. </a:t>
             </a:r>
-            <a:endParaRPr lang="en-CA" sz="1600" dirty="0"/>
-          </a:p>
-          <a:p>
-            <a:r>
-              <a:rPr lang="en-CA" sz="1600" dirty="0" smtClean="0"/>
+          </a:p>
+          <a:p>
+            <a:r>
+              <a:rPr lang="en-CA" sz="1600" dirty="0"/>
               <a:t>Virtualization added a Hypervisor to the servers that allowed people to access to applications through virtual machines instead of physical machines.</a:t>
             </a:r>
           </a:p>
@@ -5641,13 +5489,6 @@
   <p:transition spd="slow">
     <p:cover/>
   </p:transition>
-  <p:timing>
-    <p:tnLst>
-      <p:par>
-        <p:cTn id="1" dur="indefinite" restart="never" nodeType="tmRoot"/>
-      </p:par>
-    </p:tnLst>
-  </p:timing>
 </p:sld>
 </file>
 
@@ -5744,28 +5585,27 @@
           <a:lstStyle/>
           <a:p>
             <a:r>
-              <a:rPr lang="en-US" sz="1600" b="1" dirty="0" smtClean="0"/>
+              <a:rPr lang="en-US" sz="1600" b="1" dirty="0"/>
               <a:t>Why Switching to </a:t>
             </a:r>
             <a:r>
-              <a:rPr lang="en-US" sz="1600" b="1" dirty="0" err="1" smtClean="0"/>
+              <a:rPr lang="en-US" sz="1600" b="1" dirty="0" err="1"/>
               <a:t>OpenStack</a:t>
             </a:r>
             <a:r>
-              <a:rPr lang="en-US" sz="1600" b="1" dirty="0" smtClean="0"/>
+              <a:rPr lang="en-US" sz="1600" b="1" dirty="0"/>
               <a:t>?</a:t>
             </a:r>
           </a:p>
           <a:p>
             <a:r>
-              <a:rPr lang="en-US" sz="1600" b="1" dirty="0" smtClean="0"/>
+              <a:rPr lang="en-US" sz="1600" b="1" dirty="0"/>
               <a:t>When does Hypervisor fail?</a:t>
             </a:r>
-            <a:endParaRPr lang="en-US" sz="1600" b="1" dirty="0"/>
-          </a:p>
-          <a:p>
-            <a:r>
-              <a:rPr lang="en-CA" sz="1600" dirty="0" smtClean="0"/>
+          </a:p>
+          <a:p>
+            <a:r>
+              <a:rPr lang="en-CA" sz="1600" dirty="0"/>
               <a:t>The Hypervisor works fine up to a certain level, before adding more and more servers which makes it hard for the Hypervisor to manage them. This is a complex situation not only for the administrators, but also for the developers. In this situation both groups cannot get what they need on demand, and there is no ability to automate the routines that they frequently do in this architecture. </a:t>
             </a:r>
           </a:p>
@@ -5825,13 +5665,6 @@
   <p:transition spd="slow">
     <p:cover/>
   </p:transition>
-  <p:timing>
-    <p:tnLst>
-      <p:par>
-        <p:cTn id="1" dur="indefinite" restart="never" nodeType="tmRoot"/>
-      </p:par>
-    </p:tnLst>
-  </p:timing>
 </p:sld>
 </file>
 
@@ -5928,78 +5761,77 @@
           <a:lstStyle/>
           <a:p>
             <a:r>
-              <a:rPr lang="en-US" sz="1600" b="1" dirty="0" smtClean="0"/>
+              <a:rPr lang="en-US" sz="1600" b="1" dirty="0"/>
               <a:t>Why Switching to </a:t>
             </a:r>
             <a:r>
-              <a:rPr lang="en-US" sz="1600" b="1" dirty="0" err="1" smtClean="0"/>
+              <a:rPr lang="en-US" sz="1600" b="1" dirty="0" err="1"/>
               <a:t>OpenStack</a:t>
             </a:r>
             <a:r>
-              <a:rPr lang="en-US" sz="1600" b="1" dirty="0" smtClean="0"/>
+              <a:rPr lang="en-US" sz="1600" b="1" dirty="0"/>
               <a:t>?</a:t>
             </a:r>
           </a:p>
           <a:p>
             <a:r>
-              <a:rPr lang="en-US" sz="1600" b="1" dirty="0" smtClean="0"/>
+              <a:rPr lang="en-US" sz="1600" b="1" dirty="0"/>
               <a:t>What </a:t>
             </a:r>
             <a:r>
-              <a:rPr lang="en-US" sz="1600" b="1" dirty="0" err="1" smtClean="0"/>
+              <a:rPr lang="en-US" sz="1600" b="1" dirty="0" err="1"/>
               <a:t>OpenStack</a:t>
             </a:r>
             <a:r>
-              <a:rPr lang="en-US" sz="1600" b="1" dirty="0" smtClean="0"/>
+              <a:rPr lang="en-US" sz="1600" b="1" dirty="0"/>
               <a:t> Does?</a:t>
             </a:r>
-            <a:endParaRPr lang="en-US" sz="1600" b="1" dirty="0"/>
-          </a:p>
-          <a:p>
-            <a:r>
-              <a:rPr lang="en-CA" sz="1600" dirty="0" err="1" smtClean="0"/>
+          </a:p>
+          <a:p>
+            <a:r>
+              <a:rPr lang="en-CA" sz="1600" dirty="0" err="1"/>
               <a:t>OpenStack</a:t>
             </a:r>
             <a:r>
-              <a:rPr lang="en-CA" sz="1600" dirty="0" smtClean="0"/>
+              <a:rPr lang="en-CA" sz="1600" dirty="0"/>
               <a:t> turns all set of Hypervisors within a datacentre or number of datacentres, providing pools of different resources. Those pools of resources can be managed and consumed from a single place, which is </a:t>
             </a:r>
             <a:r>
-              <a:rPr lang="en-CA" sz="1600" dirty="0" err="1" smtClean="0"/>
+              <a:rPr lang="en-CA" sz="1600" dirty="0" err="1"/>
               <a:t>OpenStack</a:t>
             </a:r>
             <a:r>
-              <a:rPr lang="en-CA" sz="1600" dirty="0" smtClean="0"/>
+              <a:rPr lang="en-CA" sz="1600" dirty="0"/>
               <a:t>. The APIs are available which are programing interfaces, and </a:t>
             </a:r>
             <a:r>
-              <a:rPr lang="en-CA" sz="1600" dirty="0" err="1" smtClean="0"/>
+              <a:rPr lang="en-CA" sz="1600" dirty="0" err="1"/>
               <a:t>OpenStack</a:t>
             </a:r>
             <a:r>
-              <a:rPr lang="en-CA" sz="1600" dirty="0" smtClean="0"/>
+              <a:rPr lang="en-CA" sz="1600" dirty="0"/>
               <a:t> Dashboard provides the ability to manage whatever can be achieved by </a:t>
             </a:r>
             <a:r>
-              <a:rPr lang="en-CA" sz="1600" dirty="0" err="1" smtClean="0"/>
+              <a:rPr lang="en-CA" sz="1600" dirty="0" err="1"/>
               <a:t>OpenStack</a:t>
             </a:r>
             <a:r>
-              <a:rPr lang="en-CA" sz="1600" dirty="0" smtClean="0"/>
+              <a:rPr lang="en-CA" sz="1600" dirty="0"/>
               <a:t> through a visual interface.</a:t>
             </a:r>
           </a:p>
           <a:p>
             <a:r>
-              <a:rPr lang="en-CA" sz="1600" dirty="0" smtClean="0"/>
+              <a:rPr lang="en-CA" sz="1600" dirty="0"/>
               <a:t>From another perspective we can say,  </a:t>
             </a:r>
             <a:r>
-              <a:rPr lang="en-CA" sz="1600" dirty="0" err="1" smtClean="0"/>
+              <a:rPr lang="en-CA" sz="1600" dirty="0" err="1"/>
               <a:t>OpenStack</a:t>
             </a:r>
             <a:r>
-              <a:rPr lang="en-CA" sz="1600" dirty="0" smtClean="0"/>
+              <a:rPr lang="en-CA" sz="1600" dirty="0"/>
               <a:t> is a controller above all the virtual resources that are already available in a datacentre.    </a:t>
             </a:r>
           </a:p>
@@ -6085,13 +5917,6 @@
   <p:transition spd="slow">
     <p:cover/>
   </p:transition>
-  <p:timing>
-    <p:tnLst>
-      <p:par>
-        <p:cTn id="1" dur="indefinite" restart="never" nodeType="tmRoot"/>
-      </p:par>
-    </p:tnLst>
-  </p:timing>
 </p:sld>
 </file>
 
@@ -6188,7 +6013,7 @@
           <a:lstStyle/>
           <a:p>
             <a:r>
-              <a:rPr lang="en-US" sz="1600" b="1" dirty="0" smtClean="0"/>
+              <a:rPr lang="en-US" sz="1600" b="1" dirty="0"/>
               <a:t>Contents:</a:t>
             </a:r>
           </a:p>
@@ -6198,7 +6023,7 @@
               <a:buChar char="•"/>
             </a:pPr>
             <a:r>
-              <a:rPr lang="en-CA" sz="1600" dirty="0" smtClean="0"/>
+              <a:rPr lang="en-CA" sz="1600" dirty="0"/>
               <a:t>Cloud Computing </a:t>
             </a:r>
           </a:p>
@@ -6208,7 +6033,7 @@
               <a:buChar char="•"/>
             </a:pPr>
             <a:r>
-              <a:rPr lang="en-CA" sz="1600" dirty="0" smtClean="0"/>
+              <a:rPr lang="en-CA" sz="1600" dirty="0"/>
               <a:t>SaaS</a:t>
             </a:r>
           </a:p>
@@ -6218,10 +6043,10 @@
               <a:buChar char="•"/>
             </a:pPr>
             <a:r>
-              <a:rPr lang="en-CA" sz="1600" dirty="0" err="1" smtClean="0"/>
+              <a:rPr lang="en-CA" sz="1600" dirty="0" err="1"/>
               <a:t>PaaS</a:t>
             </a:r>
-            <a:endParaRPr lang="en-CA" sz="1600" dirty="0" smtClean="0"/>
+            <a:endParaRPr lang="en-CA" sz="1600" dirty="0"/>
           </a:p>
           <a:p>
             <a:pPr marL="742950" lvl="1" indent="-285750">
@@ -6229,10 +6054,10 @@
               <a:buChar char="•"/>
             </a:pPr>
             <a:r>
-              <a:rPr lang="en-CA" sz="1600" dirty="0" err="1" smtClean="0"/>
+              <a:rPr lang="en-CA" sz="1600" dirty="0" err="1"/>
               <a:t>IaaS</a:t>
             </a:r>
-            <a:endParaRPr lang="en-CA" sz="1600" dirty="0" smtClean="0"/>
+            <a:endParaRPr lang="en-CA" sz="1600" dirty="0"/>
           </a:p>
           <a:p>
             <a:pPr marL="285750" indent="-285750">
@@ -6240,7 +6065,7 @@
               <a:buChar char="•"/>
             </a:pPr>
             <a:r>
-              <a:rPr lang="en-CA" sz="1600" dirty="0" smtClean="0"/>
+              <a:rPr lang="en-CA" sz="1600" dirty="0"/>
               <a:t>Comparing Traditional and Modern Approaches in Cloud Computing</a:t>
             </a:r>
           </a:p>
@@ -6250,10 +6075,10 @@
               <a:buChar char="•"/>
             </a:pPr>
             <a:r>
-              <a:rPr lang="en-CA" sz="1600" dirty="0" err="1" smtClean="0"/>
+              <a:rPr lang="en-CA" sz="1600" dirty="0" err="1"/>
               <a:t>OpenStack</a:t>
             </a:r>
-            <a:endParaRPr lang="en-CA" sz="1600" dirty="0" smtClean="0"/>
+            <a:endParaRPr lang="en-CA" sz="1600" dirty="0"/>
           </a:p>
           <a:p>
             <a:pPr marL="742950" lvl="1" indent="-285750">
@@ -6269,7 +6094,7 @@
               <a:t>OpenStack</a:t>
             </a:r>
             <a:r>
-              <a:rPr lang="en-CA" sz="1600" dirty="0" smtClean="0"/>
+              <a:rPr lang="en-CA" sz="1600" dirty="0"/>
               <a:t>?</a:t>
             </a:r>
           </a:p>
@@ -6287,7 +6112,7 @@
               <a:t>OpenStack</a:t>
             </a:r>
             <a:r>
-              <a:rPr lang="en-CA" sz="1600" dirty="0" smtClean="0"/>
+              <a:rPr lang="en-CA" sz="1600" dirty="0"/>
               <a:t>?</a:t>
             </a:r>
           </a:p>
@@ -6310,7 +6135,7 @@
               <a:buFont typeface="Arial" panose="020B0604020202020204" pitchFamily="34" charset="0"/>
               <a:buChar char="•"/>
             </a:pPr>
-            <a:endParaRPr lang="en-CA" sz="1600" dirty="0" smtClean="0"/>
+            <a:endParaRPr lang="en-CA" sz="1600" dirty="0"/>
           </a:p>
         </p:txBody>
       </p:sp>
@@ -6327,13 +6152,6 @@
   <p:transition spd="slow">
     <p:cover/>
   </p:transition>
-  <p:timing>
-    <p:tnLst>
-      <p:par>
-        <p:cTn id="1" dur="indefinite" restart="never" nodeType="tmRoot"/>
-      </p:par>
-    </p:tnLst>
-  </p:timing>
 </p:sld>
 </file>
 
@@ -6430,39 +6248,39 @@
           <a:lstStyle/>
           <a:p>
             <a:r>
-              <a:rPr lang="en-US" sz="1600" b="1" dirty="0" err="1" smtClean="0"/>
+              <a:rPr lang="en-US" sz="1600" b="1" dirty="0" err="1"/>
               <a:t>OpenStack’s</a:t>
             </a:r>
             <a:r>
-              <a:rPr lang="en-US" sz="1600" b="1" dirty="0" smtClean="0"/>
+              <a:rPr lang="en-US" sz="1600" b="1" dirty="0"/>
               <a:t> Components</a:t>
             </a:r>
           </a:p>
           <a:p>
             <a:r>
-              <a:rPr lang="en-CA" sz="1600" dirty="0" smtClean="0"/>
+              <a:rPr lang="en-CA" sz="1600" dirty="0"/>
               <a:t>Nova is a component that controls the compute environment regardless of the Hypervisor that is available.  It is possible to run </a:t>
             </a:r>
             <a:r>
-              <a:rPr lang="en-CA" sz="1600" dirty="0" err="1" smtClean="0"/>
+              <a:rPr lang="en-CA" sz="1600" dirty="0" err="1"/>
               <a:t>Xen</a:t>
             </a:r>
             <a:r>
-              <a:rPr lang="en-CA" sz="1600" dirty="0" smtClean="0"/>
+              <a:rPr lang="en-CA" sz="1600" dirty="0"/>
               <a:t>, KVM, Hyper-V, VMware ESX, and many other Hypervisor, and the way to access them is consistent. </a:t>
             </a:r>
           </a:p>
           <a:p>
             <a:r>
-              <a:rPr lang="en-CA" sz="1600" dirty="0" smtClean="0"/>
+              <a:rPr lang="en-CA" sz="1600" dirty="0"/>
               <a:t>The same story is for the block storage in </a:t>
             </a:r>
             <a:r>
-              <a:rPr lang="en-CA" sz="1600" dirty="0" err="1" smtClean="0"/>
+              <a:rPr lang="en-CA" sz="1600" dirty="0" err="1"/>
               <a:t>OpenStack</a:t>
             </a:r>
             <a:r>
-              <a:rPr lang="en-CA" sz="1600" dirty="0" smtClean="0"/>
+              <a:rPr lang="en-CA" sz="1600" dirty="0"/>
               <a:t> which is called Cinder, as well as the object storage which is called SWIFT. For the network, this component is called Quantum. </a:t>
             </a:r>
           </a:p>
@@ -6522,13 +6340,6 @@
   <p:transition spd="slow">
     <p:cover/>
   </p:transition>
-  <p:timing>
-    <p:tnLst>
-      <p:par>
-        <p:cTn id="1" dur="indefinite" restart="never" nodeType="tmRoot"/>
-      </p:par>
-    </p:tnLst>
-  </p:timing>
 </p:sld>
 </file>
 
@@ -6625,27 +6436,27 @@
           <a:lstStyle/>
           <a:p>
             <a:r>
-              <a:rPr lang="en-US" sz="1600" b="1" dirty="0" smtClean="0"/>
+              <a:rPr lang="en-US" sz="1600" b="1" dirty="0"/>
               <a:t>The Complexity in Managing and Consuming  Resources</a:t>
             </a:r>
           </a:p>
           <a:p>
             <a:r>
-              <a:rPr lang="en-CA" sz="1600" dirty="0" smtClean="0"/>
+              <a:rPr lang="en-CA" sz="1600" dirty="0"/>
               <a:t>The complexity in managing and consuming resources across the heterogeneous environments and from different vendors and Hypervisors is made much easier. </a:t>
             </a:r>
           </a:p>
           <a:p>
             <a:r>
-              <a:rPr lang="en-CA" sz="1600" dirty="0" smtClean="0"/>
+              <a:rPr lang="en-CA" sz="1600" dirty="0"/>
               <a:t>The idea of </a:t>
             </a:r>
             <a:r>
-              <a:rPr lang="en-CA" sz="1600" dirty="0" err="1" smtClean="0"/>
+              <a:rPr lang="en-CA" sz="1600" dirty="0" err="1"/>
               <a:t>OpenStack</a:t>
             </a:r>
             <a:r>
-              <a:rPr lang="en-CA" sz="1600" dirty="0" smtClean="0"/>
+              <a:rPr lang="en-CA" sz="1600" dirty="0"/>
               <a:t> is to abstract administrators, and users away from the underling components, and allows them to consume those resources as a service, using the consistent set of APIs and a common Dashboard.  </a:t>
             </a:r>
           </a:p>
@@ -6703,13 +6514,6 @@
   <p:transition spd="slow">
     <p:cover/>
   </p:transition>
-  <p:timing>
-    <p:tnLst>
-      <p:par>
-        <p:cTn id="1" dur="indefinite" restart="never" nodeType="tmRoot"/>
-      </p:par>
-    </p:tnLst>
-  </p:timing>
 </p:sld>
 </file>
 
@@ -6876,7 +6680,7 @@
           </a:lstStyle>
           <a:p>
             <a:r>
-              <a:rPr lang="en-CA" sz="9600" dirty="0" smtClean="0">
+              <a:rPr lang="en-CA" sz="9600" dirty="0">
                 <a:latin typeface="Edwardian Script ITC" panose="030303020407070D0804" pitchFamily="66" charset="0"/>
               </a:rPr>
               <a:t>Thank you </a:t>
@@ -7137,7 +6941,7 @@
           <a:lstStyle/>
           <a:p>
             <a:r>
-              <a:rPr lang="en-US" sz="1600" b="1" dirty="0" smtClean="0"/>
+              <a:rPr lang="en-US" sz="1600" b="1" dirty="0"/>
               <a:t>Cloud Computing</a:t>
             </a:r>
           </a:p>
@@ -7147,7 +6951,7 @@
               <a:buChar char="•"/>
             </a:pPr>
             <a:r>
-              <a:rPr lang="en-CA" sz="1600" dirty="0" smtClean="0"/>
+              <a:rPr lang="en-CA" sz="1600" dirty="0"/>
               <a:t>Cloud Computing is where software applications, data storage, and processing capacity are accessed over the internet. </a:t>
             </a:r>
           </a:p>
@@ -7200,7 +7004,7 @@
           <a:lstStyle/>
           <a:p>
             <a:r>
-              <a:rPr lang="en-US" sz="1600" b="1" dirty="0" smtClean="0"/>
+              <a:rPr lang="en-US" sz="1600" b="1" dirty="0"/>
               <a:t>Cloud Computing Building Blocks</a:t>
             </a:r>
           </a:p>
@@ -7210,7 +7014,7 @@
               <a:buChar char="•"/>
             </a:pPr>
             <a:r>
-              <a:rPr lang="en-CA" sz="1600" dirty="0" smtClean="0"/>
+              <a:rPr lang="en-CA" sz="1600" dirty="0"/>
               <a:t>SaaS (Software as a Service)</a:t>
             </a:r>
           </a:p>
@@ -7220,11 +7024,11 @@
               <a:buChar char="•"/>
             </a:pPr>
             <a:r>
-              <a:rPr lang="en-CA" sz="1600" dirty="0" err="1" smtClean="0"/>
+              <a:rPr lang="en-CA" sz="1600" dirty="0" err="1"/>
               <a:t>PaaS</a:t>
             </a:r>
             <a:r>
-              <a:rPr lang="en-CA" sz="1600" dirty="0" smtClean="0"/>
+              <a:rPr lang="en-CA" sz="1600" dirty="0"/>
               <a:t> (Platform as a Service)</a:t>
             </a:r>
           </a:p>
@@ -7234,17 +7038,17 @@
               <a:buChar char="•"/>
             </a:pPr>
             <a:r>
-              <a:rPr lang="en-CA" sz="1600" dirty="0" err="1" smtClean="0"/>
+              <a:rPr lang="en-CA" sz="1600" dirty="0" err="1"/>
               <a:t>IaaS</a:t>
             </a:r>
             <a:r>
-              <a:rPr lang="en-CA" sz="1600" dirty="0" smtClean="0"/>
+              <a:rPr lang="en-CA" sz="1600" dirty="0"/>
               <a:t> (Infrastructure as a Service)</a:t>
             </a:r>
           </a:p>
           <a:p>
             <a:r>
-              <a:rPr lang="en-CA" sz="1600" dirty="0" smtClean="0"/>
+              <a:rPr lang="en-CA" sz="1600" dirty="0"/>
               <a:t>All these building blocks allows users to run applications and store data online; however, each offers a different level of user flexibility and control. </a:t>
             </a:r>
           </a:p>
@@ -7263,13 +7067,6 @@
   <p:transition spd="slow">
     <p:cover/>
   </p:transition>
-  <p:timing>
-    <p:tnLst>
-      <p:par>
-        <p:cTn id="1" dur="indefinite" restart="never" nodeType="tmRoot"/>
-      </p:par>
-    </p:tnLst>
-  </p:timing>
 </p:sld>
 </file>
 
@@ -7376,7 +7173,7 @@
               <a:buChar char="•"/>
             </a:pPr>
             <a:r>
-              <a:rPr lang="en-CA" sz="1600" dirty="0" smtClean="0"/>
+              <a:rPr lang="en-CA" sz="1600" dirty="0"/>
               <a:t>SaaS (Software as a Service)</a:t>
             </a:r>
           </a:p>
@@ -7386,7 +7183,7 @@
               <a:buChar char="ü"/>
             </a:pPr>
             <a:r>
-              <a:rPr lang="en-CA" sz="1600" dirty="0" smtClean="0"/>
+              <a:rPr lang="en-CA" sz="1600" dirty="0"/>
               <a:t>Allows users to run existing online applications</a:t>
             </a:r>
           </a:p>
@@ -7396,11 +7193,11 @@
               <a:buChar char="•"/>
             </a:pPr>
             <a:r>
-              <a:rPr lang="en-CA" sz="1600" dirty="0" err="1" smtClean="0"/>
+              <a:rPr lang="en-CA" sz="1600" dirty="0" err="1"/>
               <a:t>PaaS</a:t>
             </a:r>
             <a:r>
-              <a:rPr lang="en-CA" sz="1600" dirty="0" smtClean="0"/>
+              <a:rPr lang="en-CA" sz="1600" dirty="0"/>
               <a:t> (Platform as a Service)</a:t>
             </a:r>
           </a:p>
@@ -7410,7 +7207,7 @@
               <a:buChar char="ü"/>
             </a:pPr>
             <a:r>
-              <a:rPr lang="en-CA" sz="1600" dirty="0" smtClean="0"/>
+              <a:rPr lang="en-CA" sz="1600" dirty="0"/>
               <a:t>Allows users to create their own cloud applications using supplier-specific tools and language</a:t>
             </a:r>
           </a:p>
@@ -7420,11 +7217,11 @@
               <a:buChar char="•"/>
             </a:pPr>
             <a:r>
-              <a:rPr lang="en-CA" sz="1600" dirty="0" err="1" smtClean="0"/>
+              <a:rPr lang="en-CA" sz="1600" dirty="0" err="1"/>
               <a:t>IaaS</a:t>
             </a:r>
             <a:r>
-              <a:rPr lang="en-CA" sz="1600" dirty="0" smtClean="0"/>
+              <a:rPr lang="en-CA" sz="1600" dirty="0"/>
               <a:t> (Infrastructure as a Service)</a:t>
             </a:r>
           </a:p>
@@ -7435,13 +7232,8 @@
             </a:pPr>
             <a:r>
               <a:rPr lang="en-CA" sz="1600" dirty="0"/>
-              <a:t>Allows users to </a:t>
-            </a:r>
-            <a:r>
-              <a:rPr lang="en-CA" sz="1600" dirty="0" smtClean="0"/>
-              <a:t>run any applications they please on cloud hardware of their own choice</a:t>
-            </a:r>
-            <a:endParaRPr lang="en-CA" sz="1600" dirty="0"/>
+              <a:t>Allows users to run any applications they please on cloud hardware of their own choice</a:t>
+            </a:r>
           </a:p>
         </p:txBody>
       </p:sp>
@@ -7499,13 +7291,6 @@
   <p:transition spd="slow">
     <p:cover/>
   </p:transition>
-  <p:timing>
-    <p:tnLst>
-      <p:par>
-        <p:cTn id="1" dur="indefinite" restart="never" nodeType="tmRoot"/>
-      </p:par>
-    </p:tnLst>
-  </p:timing>
 </p:sld>
 </file>
 
@@ -7653,7 +7438,7 @@
               <a:buChar char="•"/>
             </a:pPr>
             <a:r>
-              <a:rPr lang="en-CA" sz="1600" dirty="0" smtClean="0"/>
+              <a:rPr lang="en-CA" sz="1600" dirty="0"/>
               <a:t>SaaS (Software as a Service)</a:t>
             </a:r>
           </a:p>
@@ -7663,7 +7448,7 @@
               <a:buChar char="ü"/>
             </a:pPr>
             <a:r>
-              <a:rPr lang="en-CA" sz="1600" dirty="0" smtClean="0"/>
+              <a:rPr lang="en-CA" sz="1600" dirty="0"/>
               <a:t>Allows users to run existing online applications</a:t>
             </a:r>
           </a:p>
@@ -7673,7 +7458,7 @@
               <a:buChar char="ü"/>
             </a:pPr>
             <a:r>
-              <a:rPr lang="en-CA" sz="1600" dirty="0" smtClean="0"/>
+              <a:rPr lang="en-CA" sz="1600" dirty="0"/>
               <a:t>This is the easiest way to cloud compute, and is where off-the-shelf applications are accessed over the internet.</a:t>
             </a:r>
           </a:p>
@@ -7683,7 +7468,7 @@
               <a:buChar char="o"/>
             </a:pPr>
             <a:r>
-              <a:rPr lang="en-CA" sz="1600" dirty="0" smtClean="0"/>
+              <a:rPr lang="en-CA" sz="1600" dirty="0"/>
               <a:t>Google Docs</a:t>
             </a:r>
           </a:p>
@@ -7693,7 +7478,7 @@
               <a:buChar char="o"/>
             </a:pPr>
             <a:r>
-              <a:rPr lang="en-CA" sz="1600" dirty="0" smtClean="0"/>
+              <a:rPr lang="en-CA" sz="1600" dirty="0"/>
               <a:t>Microsoft Office Web Apps</a:t>
             </a:r>
           </a:p>
@@ -7703,10 +7488,10 @@
               <a:buChar char="o"/>
             </a:pPr>
             <a:r>
-              <a:rPr lang="en-CA" sz="1600" dirty="0" err="1" smtClean="0"/>
+              <a:rPr lang="en-CA" sz="1600" dirty="0" err="1"/>
               <a:t>Zoho</a:t>
             </a:r>
-            <a:endParaRPr lang="en-CA" sz="1600" dirty="0" smtClean="0"/>
+            <a:endParaRPr lang="en-CA" sz="1600" dirty="0"/>
           </a:p>
           <a:p>
             <a:pPr marL="285750" indent="-285750">
@@ -7724,7 +7509,7 @@
               <a:buChar char="ü"/>
             </a:pPr>
             <a:r>
-              <a:rPr lang="en-CA" sz="1600" dirty="0" smtClean="0">
+              <a:rPr lang="en-CA" sz="1600" dirty="0">
                 <a:solidFill>
                   <a:schemeClr val="tx2">
                     <a:lumMod val="60000"/>
@@ -7741,7 +7526,7 @@
               <a:buChar char="ü"/>
             </a:pPr>
             <a:r>
-              <a:rPr lang="en-CA" sz="1600" dirty="0" smtClean="0">
+              <a:rPr lang="en-CA" sz="1600" dirty="0">
                 <a:solidFill>
                   <a:schemeClr val="tx2">
                     <a:lumMod val="60000"/>
@@ -7758,7 +7543,7 @@
               <a:buChar char="ü"/>
             </a:pPr>
             <a:r>
-              <a:rPr lang="en-CA" sz="1600" dirty="0" smtClean="0">
+              <a:rPr lang="en-CA" sz="1600" dirty="0">
                 <a:solidFill>
                   <a:schemeClr val="tx2">
                     <a:lumMod val="60000"/>
@@ -7775,7 +7560,7 @@
               <a:buChar char="⁻"/>
             </a:pPr>
             <a:r>
-              <a:rPr lang="en-CA" sz="1600" dirty="0" smtClean="0">
+              <a:rPr lang="en-CA" sz="1600" dirty="0">
                 <a:solidFill>
                   <a:srgbClr val="FF0000"/>
                 </a:solidFill>
@@ -7798,13 +7583,6 @@
   <p:transition spd="slow">
     <p:cover/>
   </p:transition>
-  <p:timing>
-    <p:tnLst>
-      <p:par>
-        <p:cTn id="1" dur="indefinite" restart="never" nodeType="tmRoot"/>
-      </p:par>
-    </p:tnLst>
-  </p:timing>
 </p:sld>
 </file>
 
@@ -7952,11 +7730,11 @@
               <a:buChar char="•"/>
             </a:pPr>
             <a:r>
-              <a:rPr lang="en-CA" sz="1600" dirty="0" err="1" smtClean="0"/>
+              <a:rPr lang="en-CA" sz="1600" dirty="0" err="1"/>
               <a:t>PaaS</a:t>
             </a:r>
             <a:r>
-              <a:rPr lang="en-CA" sz="1600" dirty="0" smtClean="0"/>
+              <a:rPr lang="en-CA" sz="1600" dirty="0"/>
               <a:t> (Platform as a Service)</a:t>
             </a:r>
           </a:p>
@@ -7966,7 +7744,7 @@
               <a:buChar char="ü"/>
             </a:pPr>
             <a:r>
-              <a:rPr lang="en-CA" sz="1600" dirty="0" smtClean="0"/>
+              <a:rPr lang="en-CA" sz="1600" dirty="0"/>
               <a:t>Allows users to create their own cloud applications using supplier-specific tools and language</a:t>
             </a:r>
           </a:p>
@@ -7976,7 +7754,7 @@
               <a:buChar char="ü"/>
             </a:pPr>
             <a:r>
-              <a:rPr lang="en-CA" sz="1600" dirty="0" smtClean="0"/>
+              <a:rPr lang="en-CA" sz="1600" dirty="0"/>
               <a:t>Provides environment and set of tools for creating new online applications</a:t>
             </a:r>
           </a:p>
@@ -7987,26 +7765,14 @@
             </a:pPr>
             <a:r>
               <a:rPr lang="en-CA" sz="1600" dirty="0"/>
-              <a:t>Google </a:t>
-            </a:r>
-            <a:r>
-              <a:rPr lang="en-CA" sz="1600" dirty="0" smtClean="0"/>
-              <a:t>App Engine (Enables anybody to develop and run maintainable web applications on Googles web infrastructures)</a:t>
+              <a:t>Google App Engine (Enables anybody to develop and run maintainable web applications on Googles web infrastructures)</a:t>
             </a:r>
           </a:p>
           <a:p>
             <a:pPr lvl="3"/>
             <a:r>
               <a:rPr lang="en-CA" sz="1600" dirty="0"/>
-              <a:t> </a:t>
-            </a:r>
-            <a:r>
-              <a:rPr lang="en-CA" sz="1600" dirty="0" smtClean="0"/>
-              <a:t>    (</a:t>
-            </a:r>
-            <a:r>
-              <a:rPr lang="en-CA" sz="1600" dirty="0"/>
-              <a:t>building and hosting the application is free    </a:t>
+              <a:t>     (building and hosting the application is free    </a:t>
             </a:r>
           </a:p>
           <a:p>
@@ -8016,21 +7782,8 @@
             </a:pPr>
             <a:r>
               <a:rPr lang="en-CA" sz="1600" dirty="0"/>
-              <a:t>Microsoft </a:t>
-            </a:r>
-            <a:r>
-              <a:rPr lang="en-CA" sz="1600" dirty="0" smtClean="0"/>
-              <a:t>Azure Platform (Allows users to develop and run windows applications in </a:t>
-            </a:r>
-            <a:r>
-              <a:rPr lang="en-CA" sz="1600" dirty="0"/>
-              <a:t>M</a:t>
-            </a:r>
-            <a:r>
-              <a:rPr lang="en-CA" sz="1600" dirty="0" smtClean="0"/>
-              <a:t>icrosoft region of the cloud)</a:t>
-            </a:r>
-            <a:endParaRPr lang="en-CA" sz="1600" dirty="0"/>
+              <a:t>Microsoft Azure Platform (Allows users to develop and run windows applications in Microsoft region of the cloud)</a:t>
+            </a:r>
           </a:p>
           <a:p>
             <a:pPr marL="1657350" lvl="3" indent="-285750">
@@ -8038,16 +7791,12 @@
               <a:buChar char="o"/>
             </a:pPr>
             <a:r>
-              <a:rPr lang="en-CA" sz="1600" dirty="0" err="1" smtClean="0"/>
+              <a:rPr lang="en-CA" sz="1600" dirty="0" err="1"/>
               <a:t>Salesforcce</a:t>
             </a:r>
             <a:r>
-              <a:rPr lang="en-CA" sz="1600" dirty="0" smtClean="0"/>
-              <a:t> </a:t>
-            </a:r>
-            <a:r>
-              <a:rPr lang="en-CA" sz="1600" dirty="0"/>
-              <a:t>(building and hosting the application is free) </a:t>
+              <a:rPr lang="en-CA" sz="1600" dirty="0"/>
+              <a:t> (building and hosting the application is free) </a:t>
             </a:r>
           </a:p>
           <a:p>
@@ -8056,16 +7805,12 @@
               <a:buChar char="•"/>
             </a:pPr>
             <a:r>
-              <a:rPr lang="en-CA" sz="1600" dirty="0" err="1" smtClean="0"/>
+              <a:rPr lang="en-CA" sz="1600" dirty="0" err="1"/>
               <a:t>PaaS</a:t>
             </a:r>
             <a:r>
-              <a:rPr lang="en-CA" sz="1600" dirty="0" smtClean="0"/>
-              <a:t> </a:t>
-            </a:r>
-            <a:r>
-              <a:rPr lang="en-CA" sz="1600" dirty="0"/>
-              <a:t>Pros &amp; Cons</a:t>
+              <a:rPr lang="en-CA" sz="1600" dirty="0"/>
+              <a:t> Pros &amp; Cons</a:t>
             </a:r>
           </a:p>
           <a:p>
@@ -8074,7 +7819,7 @@
               <a:buChar char="ü"/>
             </a:pPr>
             <a:r>
-              <a:rPr lang="en-CA" sz="1600" dirty="0" smtClean="0">
+              <a:rPr lang="en-CA" sz="1600" dirty="0">
                 <a:solidFill>
                   <a:schemeClr val="tx2">
                     <a:lumMod val="60000"/>
@@ -8084,14 +7829,6 @@
               </a:rPr>
               <a:t>Rapid development at low cost</a:t>
             </a:r>
-            <a:endParaRPr lang="en-CA" sz="1600" dirty="0">
-              <a:solidFill>
-                <a:schemeClr val="tx2">
-                  <a:lumMod val="60000"/>
-                  <a:lumOff val="40000"/>
-                </a:schemeClr>
-              </a:solidFill>
-            </a:endParaRPr>
           </a:p>
           <a:p>
             <a:pPr marL="1200150" lvl="2" indent="-285750">
@@ -8099,7 +7836,7 @@
               <a:buChar char="ü"/>
             </a:pPr>
             <a:r>
-              <a:rPr lang="en-CA" sz="1600" dirty="0" smtClean="0">
+              <a:rPr lang="en-CA" sz="1600" dirty="0">
                 <a:solidFill>
                   <a:schemeClr val="tx2">
                     <a:lumMod val="60000"/>
@@ -8109,14 +7846,6 @@
               </a:rPr>
               <a:t>These application are deployed privately or publicly</a:t>
             </a:r>
-            <a:endParaRPr lang="en-CA" sz="1600" dirty="0">
-              <a:solidFill>
-                <a:schemeClr val="tx2">
-                  <a:lumMod val="60000"/>
-                  <a:lumOff val="40000"/>
-                </a:schemeClr>
-              </a:solidFill>
-            </a:endParaRPr>
           </a:p>
           <a:p>
             <a:pPr marL="1200150" lvl="2" indent="-285750">
@@ -8124,7 +7853,7 @@
               <a:buChar char="⁻"/>
             </a:pPr>
             <a:r>
-              <a:rPr lang="en-CA" sz="1600" dirty="0" smtClean="0">
+              <a:rPr lang="en-CA" sz="1600" dirty="0">
                 <a:solidFill>
                   <a:srgbClr val="FF0000"/>
                 </a:solidFill>
@@ -8132,7 +7861,7 @@
               <a:t>Limits developers to provides languages and tools that </a:t>
             </a:r>
             <a:r>
-              <a:rPr lang="en-CA" sz="1600" dirty="0" err="1" smtClean="0">
+              <a:rPr lang="en-CA" sz="1600" dirty="0" err="1">
                 <a:solidFill>
                   <a:srgbClr val="FF0000"/>
                 </a:solidFill>
@@ -8140,18 +7869,13 @@
               <a:t>PaaS</a:t>
             </a:r>
             <a:r>
-              <a:rPr lang="en-CA" sz="1600" dirty="0" smtClean="0">
+              <a:rPr lang="en-CA" sz="1600" dirty="0">
                 <a:solidFill>
                   <a:srgbClr val="FF0000"/>
                 </a:solidFill>
               </a:rPr>
               <a:t> providers have offered</a:t>
             </a:r>
-            <a:endParaRPr lang="en-CA" sz="1600" dirty="0">
-              <a:solidFill>
-                <a:srgbClr val="FF0000"/>
-              </a:solidFill>
-            </a:endParaRPr>
           </a:p>
           <a:p>
             <a:pPr marL="1200150" lvl="2" indent="-285750">
@@ -8159,7 +7883,7 @@
               <a:buChar char="⁻"/>
             </a:pPr>
             <a:r>
-              <a:rPr lang="en-CA" sz="1600" dirty="0" smtClean="0">
+              <a:rPr lang="en-CA" sz="1600" dirty="0">
                 <a:solidFill>
                   <a:srgbClr val="FF0000"/>
                 </a:solidFill>
@@ -8182,13 +7906,6 @@
   <p:transition spd="slow">
     <p:cover/>
   </p:transition>
-  <p:timing>
-    <p:tnLst>
-      <p:par>
-        <p:cTn id="1" dur="indefinite" restart="never" nodeType="tmRoot"/>
-      </p:par>
-    </p:tnLst>
-  </p:timing>
 </p:sld>
 </file>
 
@@ -8286,11 +8003,7 @@
           <a:p>
             <a:r>
               <a:rPr lang="en-US" sz="1600" b="1" dirty="0"/>
-              <a:t>Building Blocks of Cloud Computing</a:t>
-            </a:r>
-            <a:r>
-              <a:rPr lang="en-US" sz="1600" b="1" dirty="0" smtClean="0"/>
-              <a:t>:</a:t>
+              <a:t>Building Blocks of Cloud Computing:</a:t>
             </a:r>
             <a:endParaRPr lang="en-CA" sz="1600" dirty="0">
               <a:solidFill>
@@ -8304,11 +8017,11 @@
               <a:buChar char="•"/>
             </a:pPr>
             <a:r>
-              <a:rPr lang="en-CA" sz="1600" dirty="0" err="1" smtClean="0"/>
+              <a:rPr lang="en-CA" sz="1600" dirty="0" err="1"/>
               <a:t>IaaS</a:t>
             </a:r>
             <a:r>
-              <a:rPr lang="en-CA" sz="1600" dirty="0" smtClean="0"/>
+              <a:rPr lang="en-CA" sz="1600" dirty="0"/>
               <a:t> (Infrastructure as a Service)</a:t>
             </a:r>
           </a:p>
@@ -8319,11 +8032,7 @@
             </a:pPr>
             <a:r>
               <a:rPr lang="en-CA" sz="1600" dirty="0"/>
-              <a:t>Allows users to </a:t>
-            </a:r>
-            <a:r>
-              <a:rPr lang="en-CA" sz="1600" dirty="0" smtClean="0"/>
-              <a:t>run any applications they please on cloud hardware of their own choice</a:t>
+              <a:t>Allows users to run any applications they please on cloud hardware of their own choice</a:t>
             </a:r>
           </a:p>
           <a:p>
@@ -8332,7 +8041,7 @@
               <a:buChar char="ü"/>
             </a:pPr>
             <a:r>
-              <a:rPr lang="en-CA" sz="1600" dirty="0" smtClean="0"/>
+              <a:rPr lang="en-CA" sz="1600" dirty="0"/>
               <a:t>Allows existing applications to be run on a cloud supplier’s hardware</a:t>
             </a:r>
           </a:p>
@@ -8342,18 +8051,17 @@
               <a:buChar char="o"/>
             </a:pPr>
             <a:r>
-              <a:rPr lang="en-CA" sz="1600" dirty="0" smtClean="0"/>
+              <a:rPr lang="en-CA" sz="1600" dirty="0"/>
               <a:t>This allows the existing applications can be migrated from a company data centre to </a:t>
             </a:r>
             <a:r>
-              <a:rPr lang="en-CA" sz="1600" dirty="0" err="1" smtClean="0"/>
+              <a:rPr lang="en-CA" sz="1600" dirty="0" err="1"/>
               <a:t>IaaS</a:t>
             </a:r>
             <a:r>
-              <a:rPr lang="en-CA" sz="1600" dirty="0" smtClean="0"/>
+              <a:rPr lang="en-CA" sz="1600" dirty="0"/>
               <a:t> environment in order to reduce IT costs</a:t>
             </a:r>
-            <a:endParaRPr lang="en-CA" sz="1600" dirty="0"/>
           </a:p>
         </p:txBody>
       </p:sp>
@@ -8411,13 +8119,6 @@
   <p:transition spd="slow">
     <p:cover/>
   </p:transition>
-  <p:timing>
-    <p:tnLst>
-      <p:par>
-        <p:cTn id="1" dur="indefinite" restart="never" nodeType="tmRoot"/>
-      </p:par>
-    </p:tnLst>
-  </p:timing>
 </p:sld>
 </file>
 
@@ -8514,7 +8215,7 @@
           <a:lstStyle/>
           <a:p>
             <a:r>
-              <a:rPr lang="en-CA" sz="1600" b="1" dirty="0" smtClean="0"/>
+              <a:rPr lang="en-CA" sz="1600" b="1" dirty="0"/>
               <a:t>The Cloud Fundamental Unit of Cloud Infrastructure</a:t>
             </a:r>
             <a:endParaRPr lang="en-CA" sz="1600" dirty="0">
@@ -8530,11 +8231,7 @@
             </a:pPr>
             <a:r>
               <a:rPr lang="en-CA" sz="1600" dirty="0"/>
-              <a:t>The Cloud Fundamental Unit of Cloud </a:t>
-            </a:r>
-            <a:r>
-              <a:rPr lang="en-CA" sz="1600" dirty="0" smtClean="0"/>
-              <a:t>Infrastructure is the server. Today, the servers could be either physical, or virtual. </a:t>
+              <a:t>The Cloud Fundamental Unit of Cloud Infrastructure is the server. Today, the servers could be either physical, or virtual. </a:t>
             </a:r>
           </a:p>
           <a:p>
@@ -8543,7 +8240,7 @@
               <a:buChar char="§"/>
             </a:pPr>
             <a:r>
-              <a:rPr lang="en-CA" sz="1600" dirty="0" smtClean="0"/>
+              <a:rPr lang="en-CA" sz="1600" dirty="0"/>
               <a:t>Physical Servers: Individual discrete individual computers</a:t>
             </a:r>
           </a:p>
@@ -8553,10 +8250,9 @@
               <a:buChar char="§"/>
             </a:pPr>
             <a:r>
-              <a:rPr lang="en-CA" sz="1600" dirty="0" smtClean="0"/>
+              <a:rPr lang="en-CA" sz="1600" dirty="0"/>
               <a:t>Virtual Servers (or Virtual Server Instances): Software control slices of real physical servers. This virtualization allows many users to share one physical server.</a:t>
             </a:r>
-            <a:endParaRPr lang="en-CA" sz="1600" dirty="0"/>
           </a:p>
         </p:txBody>
       </p:sp>
@@ -8653,13 +8349,6 @@
   <p:transition spd="slow">
     <p:cover/>
   </p:transition>
-  <p:timing>
-    <p:tnLst>
-      <p:par>
-        <p:cTn id="1" dur="indefinite" restart="never" nodeType="tmRoot"/>
-      </p:par>
-    </p:tnLst>
-  </p:timing>
 </p:sld>
 </file>
 
@@ -8756,11 +8445,11 @@
           <a:lstStyle/>
           <a:p>
             <a:r>
-              <a:rPr lang="en-CA" sz="1600" b="1" dirty="0" err="1" smtClean="0"/>
+              <a:rPr lang="en-CA" sz="1600" b="1" dirty="0" err="1"/>
               <a:t>IaaS</a:t>
             </a:r>
             <a:r>
-              <a:rPr lang="en-CA" sz="1600" b="1" dirty="0" smtClean="0"/>
+              <a:rPr lang="en-CA" sz="1600" b="1" dirty="0"/>
               <a:t> Categories:</a:t>
             </a:r>
             <a:endParaRPr lang="en-CA" sz="1600" dirty="0">
@@ -8775,15 +8464,15 @@
               <a:buChar char="•"/>
             </a:pPr>
             <a:r>
-              <a:rPr lang="en-CA" sz="1600" dirty="0" smtClean="0"/>
+              <a:rPr lang="en-CA" sz="1600" dirty="0"/>
               <a:t>Based on the servers which are used and the services that involved, </a:t>
             </a:r>
             <a:r>
-              <a:rPr lang="en-CA" sz="1600" dirty="0" err="1" smtClean="0"/>
+              <a:rPr lang="en-CA" sz="1600" dirty="0" err="1"/>
               <a:t>IaaS</a:t>
             </a:r>
             <a:r>
-              <a:rPr lang="en-CA" sz="1600" dirty="0" smtClean="0"/>
+              <a:rPr lang="en-CA" sz="1600" dirty="0"/>
               <a:t> Categories are classified into four different hosting levels</a:t>
             </a:r>
           </a:p>
@@ -8793,7 +8482,7 @@
               <a:buChar char="ü"/>
             </a:pPr>
             <a:r>
-              <a:rPr lang="en-CA" sz="1600" dirty="0" smtClean="0"/>
+              <a:rPr lang="en-CA" sz="1600" dirty="0"/>
               <a:t>Private Cloud </a:t>
             </a:r>
           </a:p>
@@ -8803,7 +8492,7 @@
               <a:buChar char="§"/>
             </a:pPr>
             <a:r>
-              <a:rPr lang="en-CA" sz="1600" dirty="0" smtClean="0"/>
+              <a:rPr lang="en-CA" sz="1600" dirty="0"/>
               <a:t>The most secure and costly option: In this architecture,  a number of physical servers are dedicated to one customer.</a:t>
             </a:r>
           </a:p>
@@ -8812,7 +8501,7 @@
               <a:buFont typeface="Wingdings" panose="05000000000000000000" pitchFamily="2" charset="2"/>
               <a:buChar char="§"/>
             </a:pPr>
-            <a:endParaRPr lang="en-CA" sz="1600" dirty="0" smtClean="0"/>
+            <a:endParaRPr lang="en-CA" sz="1600" dirty="0"/>
           </a:p>
           <a:p>
             <a:pPr marL="742950" lvl="1" indent="-285750">
@@ -8820,7 +8509,7 @@
               <a:buChar char="ü"/>
             </a:pPr>
             <a:r>
-              <a:rPr lang="en-CA" sz="1600" dirty="0" smtClean="0"/>
+              <a:rPr lang="en-CA" sz="1600" dirty="0"/>
               <a:t>Dedicated Hosting</a:t>
             </a:r>
           </a:p>
@@ -8830,7 +8519,7 @@
               <a:buChar char="§"/>
             </a:pPr>
             <a:r>
-              <a:rPr lang="en-CA" sz="1600" dirty="0" smtClean="0"/>
+              <a:rPr lang="en-CA" sz="1600" dirty="0"/>
               <a:t>In this architecture, customers rent physical servers on demand, In order to match their requirements. </a:t>
             </a:r>
           </a:p>
@@ -8839,7 +8528,7 @@
               <a:buFont typeface="Wingdings" panose="05000000000000000000" pitchFamily="2" charset="2"/>
               <a:buChar char="§"/>
             </a:pPr>
-            <a:endParaRPr lang="en-CA" sz="1600" dirty="0" smtClean="0"/>
+            <a:endParaRPr lang="en-CA" sz="1600" dirty="0"/>
           </a:p>
           <a:p>
             <a:pPr marL="742950" lvl="1" indent="-285750">
@@ -8847,7 +8536,7 @@
               <a:buChar char="ü"/>
             </a:pPr>
             <a:r>
-              <a:rPr lang="en-CA" sz="1600" dirty="0" smtClean="0"/>
+              <a:rPr lang="en-CA" sz="1600" dirty="0"/>
               <a:t>Hybrid Hosting</a:t>
             </a:r>
           </a:p>
@@ -8857,7 +8546,7 @@
               <a:buChar char="§"/>
             </a:pPr>
             <a:r>
-              <a:rPr lang="en-CA" sz="1600" dirty="0" smtClean="0"/>
+              <a:rPr lang="en-CA" sz="1600" dirty="0"/>
               <a:t>This architecture is the mix of physical servers and virtual server instances, and they are rented on demand, in an effort to reduce cost and further increase flexibility. </a:t>
             </a:r>
           </a:p>
@@ -8866,7 +8555,7 @@
               <a:buFont typeface="Wingdings" panose="05000000000000000000" pitchFamily="2" charset="2"/>
               <a:buChar char="§"/>
             </a:pPr>
-            <a:endParaRPr lang="en-CA" sz="1600" dirty="0" smtClean="0"/>
+            <a:endParaRPr lang="en-CA" sz="1600" dirty="0"/>
           </a:p>
           <a:p>
             <a:pPr marL="742950" lvl="1" indent="-285750">
@@ -8874,7 +8563,7 @@
               <a:buChar char="ü"/>
             </a:pPr>
             <a:r>
-              <a:rPr lang="en-CA" sz="1600" dirty="0" smtClean="0"/>
+              <a:rPr lang="en-CA" sz="1600" dirty="0"/>
               <a:t>Cloud Hosting</a:t>
             </a:r>
           </a:p>
@@ -8884,7 +8573,7 @@
               <a:buChar char="§"/>
             </a:pPr>
             <a:r>
-              <a:rPr lang="en-CA" sz="1600" dirty="0" smtClean="0"/>
+              <a:rPr lang="en-CA" sz="1600" dirty="0"/>
               <a:t>In this architecture the customers rent the virtual instances on demand, mostly on an hourly bases.  </a:t>
             </a:r>
           </a:p>
@@ -9118,13 +8807,6 @@
   <p:transition spd="slow">
     <p:cover/>
   </p:transition>
-  <p:timing>
-    <p:tnLst>
-      <p:par>
-        <p:cTn id="1" dur="indefinite" restart="never" nodeType="tmRoot"/>
-      </p:par>
-    </p:tnLst>
-  </p:timing>
 </p:sld>
 </file>
 

</xml_diff>